<commit_message>
AB - Added 2 new map locations, the Old Inn and the Garden
</commit_message>
<xml_diff>
--- a/GroudLevelMap.pptx
+++ b/GroudLevelMap.pptx
@@ -269,7 +269,7 @@
           <a:p>
             <a:fld id="{4324A8F5-F1ED-4D05-8890-CA30F1CF831D}" type="datetimeFigureOut">
               <a:rPr lang="en-GB" smtClean="0"/>
-              <a:t>31/01/2016</a:t>
+              <a:t>11/10/2016</a:t>
             </a:fld>
             <a:endParaRPr lang="en-GB"/>
           </a:p>
@@ -333,35 +333,35 @@
           <a:p>
             <a:pPr lvl="0"/>
             <a:r>
-              <a:rPr lang="en-US" smtClean="0"/>
+              <a:rPr lang="en-US"/>
               <a:t>Click to edit Master text styles</a:t>
             </a:r>
           </a:p>
           <a:p>
             <a:pPr lvl="1"/>
             <a:r>
-              <a:rPr lang="en-US" smtClean="0"/>
+              <a:rPr lang="en-US"/>
               <a:t>Second level</a:t>
             </a:r>
           </a:p>
           <a:p>
             <a:pPr lvl="2"/>
             <a:r>
-              <a:rPr lang="en-US" smtClean="0"/>
+              <a:rPr lang="en-US"/>
               <a:t>Third level</a:t>
             </a:r>
           </a:p>
           <a:p>
             <a:pPr lvl="3"/>
             <a:r>
-              <a:rPr lang="en-US" smtClean="0"/>
+              <a:rPr lang="en-US"/>
               <a:t>Fourth level</a:t>
             </a:r>
           </a:p>
           <a:p>
             <a:pPr lvl="4"/>
             <a:r>
-              <a:rPr lang="en-US" smtClean="0"/>
+              <a:rPr lang="en-US"/>
               <a:t>Fifth level</a:t>
             </a:r>
             <a:endParaRPr lang="en-GB"/>
@@ -599,7 +599,7 @@
               <a:defRPr/>
             </a:pPr>
             <a:r>
-              <a:rPr lang="en-GB" b="0" i="0" dirty="0" smtClean="0">
+              <a:rPr lang="en-GB" b="0" i="0" dirty="0">
                 <a:solidFill>
                   <a:srgbClr val="333333"/>
                 </a:solidFill>
@@ -609,7 +609,7 @@
               <a:t>The inscription is a Caesar shift of 13. Translating too: “The way is shut. It wa</a:t>
             </a:r>
             <a:r>
-              <a:rPr lang="en-GB" dirty="0" smtClean="0">
+              <a:rPr lang="en-GB" dirty="0">
                 <a:solidFill>
                   <a:srgbClr val="333333"/>
                 </a:solidFill>
@@ -618,7 +618,7 @@
               <a:t>s made by those who are Dead, and the Dead keep it.”.</a:t>
             </a:r>
             <a:r>
-              <a:rPr lang="en-GB" b="0" i="0" dirty="0" smtClean="0">
+              <a:rPr lang="en-GB" b="0" i="0" dirty="0">
                 <a:solidFill>
                   <a:srgbClr val="333333"/>
                 </a:solidFill>
@@ -627,7 +627,7 @@
               </a:rPr>
               <a:t> </a:t>
             </a:r>
-            <a:endParaRPr lang="en-GB" dirty="0" smtClean="0"/>
+            <a:endParaRPr lang="en-GB" dirty="0"/>
           </a:p>
           <a:p>
             <a:endParaRPr lang="en-GB" dirty="0"/>
@@ -796,7 +796,7 @@
           </a:lstStyle>
           <a:p>
             <a:r>
-              <a:rPr lang="en-US" smtClean="0"/>
+              <a:rPr lang="en-US"/>
               <a:t>Click to edit Master title style</a:t>
             </a:r>
             <a:endParaRPr lang="en-GB"/>
@@ -861,7 +861,7 @@
           </a:lstStyle>
           <a:p>
             <a:r>
-              <a:rPr lang="en-US" smtClean="0"/>
+              <a:rPr lang="en-US"/>
               <a:t>Click to edit Master subtitle style</a:t>
             </a:r>
             <a:endParaRPr lang="en-GB"/>
@@ -885,7 +885,7 @@
           <a:p>
             <a:fld id="{E84557DF-487D-4A7D-AC14-41C025B26206}" type="datetimeFigureOut">
               <a:rPr lang="en-GB" smtClean="0"/>
-              <a:t>31/01/2016</a:t>
+              <a:t>11/10/2016</a:t>
             </a:fld>
             <a:endParaRPr lang="en-GB"/>
           </a:p>
@@ -979,7 +979,7 @@
           <a:lstStyle/>
           <a:p>
             <a:r>
-              <a:rPr lang="en-US" smtClean="0"/>
+              <a:rPr lang="en-US"/>
               <a:t>Click to edit Master title style</a:t>
             </a:r>
             <a:endParaRPr lang="en-GB"/>
@@ -1003,35 +1003,35 @@
           <a:p>
             <a:pPr lvl="0"/>
             <a:r>
-              <a:rPr lang="en-US" smtClean="0"/>
+              <a:rPr lang="en-US"/>
               <a:t>Click to edit Master text styles</a:t>
             </a:r>
           </a:p>
           <a:p>
             <a:pPr lvl="1"/>
             <a:r>
-              <a:rPr lang="en-US" smtClean="0"/>
+              <a:rPr lang="en-US"/>
               <a:t>Second level</a:t>
             </a:r>
           </a:p>
           <a:p>
             <a:pPr lvl="2"/>
             <a:r>
-              <a:rPr lang="en-US" smtClean="0"/>
+              <a:rPr lang="en-US"/>
               <a:t>Third level</a:t>
             </a:r>
           </a:p>
           <a:p>
             <a:pPr lvl="3"/>
             <a:r>
-              <a:rPr lang="en-US" smtClean="0"/>
+              <a:rPr lang="en-US"/>
               <a:t>Fourth level</a:t>
             </a:r>
           </a:p>
           <a:p>
             <a:pPr lvl="4"/>
             <a:r>
-              <a:rPr lang="en-US" smtClean="0"/>
+              <a:rPr lang="en-US"/>
               <a:t>Fifth level</a:t>
             </a:r>
             <a:endParaRPr lang="en-GB"/>
@@ -1055,7 +1055,7 @@
           <a:p>
             <a:fld id="{E84557DF-487D-4A7D-AC14-41C025B26206}" type="datetimeFigureOut">
               <a:rPr lang="en-GB" smtClean="0"/>
-              <a:t>31/01/2016</a:t>
+              <a:t>11/10/2016</a:t>
             </a:fld>
             <a:endParaRPr lang="en-GB"/>
           </a:p>
@@ -1154,7 +1154,7 @@
           <a:lstStyle/>
           <a:p>
             <a:r>
-              <a:rPr lang="en-US" smtClean="0"/>
+              <a:rPr lang="en-US"/>
               <a:t>Click to edit Master title style</a:t>
             </a:r>
             <a:endParaRPr lang="en-GB"/>
@@ -1183,35 +1183,35 @@
           <a:p>
             <a:pPr lvl="0"/>
             <a:r>
-              <a:rPr lang="en-US" smtClean="0"/>
+              <a:rPr lang="en-US"/>
               <a:t>Click to edit Master text styles</a:t>
             </a:r>
           </a:p>
           <a:p>
             <a:pPr lvl="1"/>
             <a:r>
-              <a:rPr lang="en-US" smtClean="0"/>
+              <a:rPr lang="en-US"/>
               <a:t>Second level</a:t>
             </a:r>
           </a:p>
           <a:p>
             <a:pPr lvl="2"/>
             <a:r>
-              <a:rPr lang="en-US" smtClean="0"/>
+              <a:rPr lang="en-US"/>
               <a:t>Third level</a:t>
             </a:r>
           </a:p>
           <a:p>
             <a:pPr lvl="3"/>
             <a:r>
-              <a:rPr lang="en-US" smtClean="0"/>
+              <a:rPr lang="en-US"/>
               <a:t>Fourth level</a:t>
             </a:r>
           </a:p>
           <a:p>
             <a:pPr lvl="4"/>
             <a:r>
-              <a:rPr lang="en-US" smtClean="0"/>
+              <a:rPr lang="en-US"/>
               <a:t>Fifth level</a:t>
             </a:r>
             <a:endParaRPr lang="en-GB"/>
@@ -1235,7 +1235,7 @@
           <a:p>
             <a:fld id="{E84557DF-487D-4A7D-AC14-41C025B26206}" type="datetimeFigureOut">
               <a:rPr lang="en-GB" smtClean="0"/>
-              <a:t>31/01/2016</a:t>
+              <a:t>11/10/2016</a:t>
             </a:fld>
             <a:endParaRPr lang="en-GB"/>
           </a:p>
@@ -1329,7 +1329,7 @@
           <a:lstStyle/>
           <a:p>
             <a:r>
-              <a:rPr lang="en-US" smtClean="0"/>
+              <a:rPr lang="en-US"/>
               <a:t>Click to edit Master title style</a:t>
             </a:r>
             <a:endParaRPr lang="en-GB"/>
@@ -1353,35 +1353,35 @@
           <a:p>
             <a:pPr lvl="0"/>
             <a:r>
-              <a:rPr lang="en-US" smtClean="0"/>
+              <a:rPr lang="en-US"/>
               <a:t>Click to edit Master text styles</a:t>
             </a:r>
           </a:p>
           <a:p>
             <a:pPr lvl="1"/>
             <a:r>
-              <a:rPr lang="en-US" smtClean="0"/>
+              <a:rPr lang="en-US"/>
               <a:t>Second level</a:t>
             </a:r>
           </a:p>
           <a:p>
             <a:pPr lvl="2"/>
             <a:r>
-              <a:rPr lang="en-US" smtClean="0"/>
+              <a:rPr lang="en-US"/>
               <a:t>Third level</a:t>
             </a:r>
           </a:p>
           <a:p>
             <a:pPr lvl="3"/>
             <a:r>
-              <a:rPr lang="en-US" smtClean="0"/>
+              <a:rPr lang="en-US"/>
               <a:t>Fourth level</a:t>
             </a:r>
           </a:p>
           <a:p>
             <a:pPr lvl="4"/>
             <a:r>
-              <a:rPr lang="en-US" smtClean="0"/>
+              <a:rPr lang="en-US"/>
               <a:t>Fifth level</a:t>
             </a:r>
             <a:endParaRPr lang="en-GB"/>
@@ -1405,7 +1405,7 @@
           <a:p>
             <a:fld id="{E84557DF-487D-4A7D-AC14-41C025B26206}" type="datetimeFigureOut">
               <a:rPr lang="en-GB" smtClean="0"/>
-              <a:t>31/01/2016</a:t>
+              <a:t>11/10/2016</a:t>
             </a:fld>
             <a:endParaRPr lang="en-GB"/>
           </a:p>
@@ -1508,7 +1508,7 @@
           </a:lstStyle>
           <a:p>
             <a:r>
-              <a:rPr lang="en-US" smtClean="0"/>
+              <a:rPr lang="en-US"/>
               <a:t>Click to edit Master title style</a:t>
             </a:r>
             <a:endParaRPr lang="en-GB"/>
@@ -1628,7 +1628,7 @@
           <a:p>
             <a:pPr lvl="0"/>
             <a:r>
-              <a:rPr lang="en-US" smtClean="0"/>
+              <a:rPr lang="en-US"/>
               <a:t>Click to edit Master text styles</a:t>
             </a:r>
           </a:p>
@@ -1651,7 +1651,7 @@
           <a:p>
             <a:fld id="{E84557DF-487D-4A7D-AC14-41C025B26206}" type="datetimeFigureOut">
               <a:rPr lang="en-GB" smtClean="0"/>
-              <a:t>31/01/2016</a:t>
+              <a:t>11/10/2016</a:t>
             </a:fld>
             <a:endParaRPr lang="en-GB"/>
           </a:p>
@@ -1745,7 +1745,7 @@
           <a:lstStyle/>
           <a:p>
             <a:r>
-              <a:rPr lang="en-US" smtClean="0"/>
+              <a:rPr lang="en-US"/>
               <a:t>Click to edit Master title style</a:t>
             </a:r>
             <a:endParaRPr lang="en-GB"/>
@@ -1774,35 +1774,35 @@
           <a:p>
             <a:pPr lvl="0"/>
             <a:r>
-              <a:rPr lang="en-US" smtClean="0"/>
+              <a:rPr lang="en-US"/>
               <a:t>Click to edit Master text styles</a:t>
             </a:r>
           </a:p>
           <a:p>
             <a:pPr lvl="1"/>
             <a:r>
-              <a:rPr lang="en-US" smtClean="0"/>
+              <a:rPr lang="en-US"/>
               <a:t>Second level</a:t>
             </a:r>
           </a:p>
           <a:p>
             <a:pPr lvl="2"/>
             <a:r>
-              <a:rPr lang="en-US" smtClean="0"/>
+              <a:rPr lang="en-US"/>
               <a:t>Third level</a:t>
             </a:r>
           </a:p>
           <a:p>
             <a:pPr lvl="3"/>
             <a:r>
-              <a:rPr lang="en-US" smtClean="0"/>
+              <a:rPr lang="en-US"/>
               <a:t>Fourth level</a:t>
             </a:r>
           </a:p>
           <a:p>
             <a:pPr lvl="4"/>
             <a:r>
-              <a:rPr lang="en-US" smtClean="0"/>
+              <a:rPr lang="en-US"/>
               <a:t>Fifth level</a:t>
             </a:r>
             <a:endParaRPr lang="en-GB"/>
@@ -1831,35 +1831,35 @@
           <a:p>
             <a:pPr lvl="0"/>
             <a:r>
-              <a:rPr lang="en-US" smtClean="0"/>
+              <a:rPr lang="en-US"/>
               <a:t>Click to edit Master text styles</a:t>
             </a:r>
           </a:p>
           <a:p>
             <a:pPr lvl="1"/>
             <a:r>
-              <a:rPr lang="en-US" smtClean="0"/>
+              <a:rPr lang="en-US"/>
               <a:t>Second level</a:t>
             </a:r>
           </a:p>
           <a:p>
             <a:pPr lvl="2"/>
             <a:r>
-              <a:rPr lang="en-US" smtClean="0"/>
+              <a:rPr lang="en-US"/>
               <a:t>Third level</a:t>
             </a:r>
           </a:p>
           <a:p>
             <a:pPr lvl="3"/>
             <a:r>
-              <a:rPr lang="en-US" smtClean="0"/>
+              <a:rPr lang="en-US"/>
               <a:t>Fourth level</a:t>
             </a:r>
           </a:p>
           <a:p>
             <a:pPr lvl="4"/>
             <a:r>
-              <a:rPr lang="en-US" smtClean="0"/>
+              <a:rPr lang="en-US"/>
               <a:t>Fifth level</a:t>
             </a:r>
             <a:endParaRPr lang="en-GB"/>
@@ -1883,7 +1883,7 @@
           <a:p>
             <a:fld id="{E84557DF-487D-4A7D-AC14-41C025B26206}" type="datetimeFigureOut">
               <a:rPr lang="en-GB" smtClean="0"/>
-              <a:t>31/01/2016</a:t>
+              <a:t>11/10/2016</a:t>
             </a:fld>
             <a:endParaRPr lang="en-GB"/>
           </a:p>
@@ -1982,7 +1982,7 @@
           <a:lstStyle/>
           <a:p>
             <a:r>
-              <a:rPr lang="en-US" smtClean="0"/>
+              <a:rPr lang="en-US"/>
               <a:t>Click to edit Master title style</a:t>
             </a:r>
             <a:endParaRPr lang="en-GB"/>
@@ -2048,7 +2048,7 @@
           <a:p>
             <a:pPr lvl="0"/>
             <a:r>
-              <a:rPr lang="en-US" smtClean="0"/>
+              <a:rPr lang="en-US"/>
               <a:t>Click to edit Master text styles</a:t>
             </a:r>
           </a:p>
@@ -2076,35 +2076,35 @@
           <a:p>
             <a:pPr lvl="0"/>
             <a:r>
-              <a:rPr lang="en-US" smtClean="0"/>
+              <a:rPr lang="en-US"/>
               <a:t>Click to edit Master text styles</a:t>
             </a:r>
           </a:p>
           <a:p>
             <a:pPr lvl="1"/>
             <a:r>
-              <a:rPr lang="en-US" smtClean="0"/>
+              <a:rPr lang="en-US"/>
               <a:t>Second level</a:t>
             </a:r>
           </a:p>
           <a:p>
             <a:pPr lvl="2"/>
             <a:r>
-              <a:rPr lang="en-US" smtClean="0"/>
+              <a:rPr lang="en-US"/>
               <a:t>Third level</a:t>
             </a:r>
           </a:p>
           <a:p>
             <a:pPr lvl="3"/>
             <a:r>
-              <a:rPr lang="en-US" smtClean="0"/>
+              <a:rPr lang="en-US"/>
               <a:t>Fourth level</a:t>
             </a:r>
           </a:p>
           <a:p>
             <a:pPr lvl="4"/>
             <a:r>
-              <a:rPr lang="en-US" smtClean="0"/>
+              <a:rPr lang="en-US"/>
               <a:t>Fifth level</a:t>
             </a:r>
             <a:endParaRPr lang="en-GB"/>
@@ -2170,7 +2170,7 @@
           <a:p>
             <a:pPr lvl="0"/>
             <a:r>
-              <a:rPr lang="en-US" smtClean="0"/>
+              <a:rPr lang="en-US"/>
               <a:t>Click to edit Master text styles</a:t>
             </a:r>
           </a:p>
@@ -2198,35 +2198,35 @@
           <a:p>
             <a:pPr lvl="0"/>
             <a:r>
-              <a:rPr lang="en-US" smtClean="0"/>
+              <a:rPr lang="en-US"/>
               <a:t>Click to edit Master text styles</a:t>
             </a:r>
           </a:p>
           <a:p>
             <a:pPr lvl="1"/>
             <a:r>
-              <a:rPr lang="en-US" smtClean="0"/>
+              <a:rPr lang="en-US"/>
               <a:t>Second level</a:t>
             </a:r>
           </a:p>
           <a:p>
             <a:pPr lvl="2"/>
             <a:r>
-              <a:rPr lang="en-US" smtClean="0"/>
+              <a:rPr lang="en-US"/>
               <a:t>Third level</a:t>
             </a:r>
           </a:p>
           <a:p>
             <a:pPr lvl="3"/>
             <a:r>
-              <a:rPr lang="en-US" smtClean="0"/>
+              <a:rPr lang="en-US"/>
               <a:t>Fourth level</a:t>
             </a:r>
           </a:p>
           <a:p>
             <a:pPr lvl="4"/>
             <a:r>
-              <a:rPr lang="en-US" smtClean="0"/>
+              <a:rPr lang="en-US"/>
               <a:t>Fifth level</a:t>
             </a:r>
             <a:endParaRPr lang="en-GB"/>
@@ -2250,7 +2250,7 @@
           <a:p>
             <a:fld id="{E84557DF-487D-4A7D-AC14-41C025B26206}" type="datetimeFigureOut">
               <a:rPr lang="en-GB" smtClean="0"/>
-              <a:t>31/01/2016</a:t>
+              <a:t>11/10/2016</a:t>
             </a:fld>
             <a:endParaRPr lang="en-GB"/>
           </a:p>
@@ -2344,7 +2344,7 @@
           <a:lstStyle/>
           <a:p>
             <a:r>
-              <a:rPr lang="en-US" smtClean="0"/>
+              <a:rPr lang="en-US"/>
               <a:t>Click to edit Master title style</a:t>
             </a:r>
             <a:endParaRPr lang="en-GB"/>
@@ -2368,7 +2368,7 @@
           <a:p>
             <a:fld id="{E84557DF-487D-4A7D-AC14-41C025B26206}" type="datetimeFigureOut">
               <a:rPr lang="en-GB" smtClean="0"/>
-              <a:t>31/01/2016</a:t>
+              <a:t>11/10/2016</a:t>
             </a:fld>
             <a:endParaRPr lang="en-GB"/>
           </a:p>
@@ -2463,7 +2463,7 @@
           <a:p>
             <a:fld id="{E84557DF-487D-4A7D-AC14-41C025B26206}" type="datetimeFigureOut">
               <a:rPr lang="en-GB" smtClean="0"/>
-              <a:t>31/01/2016</a:t>
+              <a:t>11/10/2016</a:t>
             </a:fld>
             <a:endParaRPr lang="en-GB"/>
           </a:p>
@@ -2566,7 +2566,7 @@
           </a:lstStyle>
           <a:p>
             <a:r>
-              <a:rPr lang="en-US" smtClean="0"/>
+              <a:rPr lang="en-US"/>
               <a:t>Click to edit Master title style</a:t>
             </a:r>
             <a:endParaRPr lang="en-GB"/>
@@ -2623,35 +2623,35 @@
           <a:p>
             <a:pPr lvl="0"/>
             <a:r>
-              <a:rPr lang="en-US" smtClean="0"/>
+              <a:rPr lang="en-US"/>
               <a:t>Click to edit Master text styles</a:t>
             </a:r>
           </a:p>
           <a:p>
             <a:pPr lvl="1"/>
             <a:r>
-              <a:rPr lang="en-US" smtClean="0"/>
+              <a:rPr lang="en-US"/>
               <a:t>Second level</a:t>
             </a:r>
           </a:p>
           <a:p>
             <a:pPr lvl="2"/>
             <a:r>
-              <a:rPr lang="en-US" smtClean="0"/>
+              <a:rPr lang="en-US"/>
               <a:t>Third level</a:t>
             </a:r>
           </a:p>
           <a:p>
             <a:pPr lvl="3"/>
             <a:r>
-              <a:rPr lang="en-US" smtClean="0"/>
+              <a:rPr lang="en-US"/>
               <a:t>Fourth level</a:t>
             </a:r>
           </a:p>
           <a:p>
             <a:pPr lvl="4"/>
             <a:r>
-              <a:rPr lang="en-US" smtClean="0"/>
+              <a:rPr lang="en-US"/>
               <a:t>Fifth level</a:t>
             </a:r>
             <a:endParaRPr lang="en-GB"/>
@@ -2717,7 +2717,7 @@
           <a:p>
             <a:pPr lvl="0"/>
             <a:r>
-              <a:rPr lang="en-US" smtClean="0"/>
+              <a:rPr lang="en-US"/>
               <a:t>Click to edit Master text styles</a:t>
             </a:r>
           </a:p>
@@ -2740,7 +2740,7 @@
           <a:p>
             <a:fld id="{E84557DF-487D-4A7D-AC14-41C025B26206}" type="datetimeFigureOut">
               <a:rPr lang="en-GB" smtClean="0"/>
-              <a:t>31/01/2016</a:t>
+              <a:t>11/10/2016</a:t>
             </a:fld>
             <a:endParaRPr lang="en-GB"/>
           </a:p>
@@ -2843,7 +2843,7 @@
           </a:lstStyle>
           <a:p>
             <a:r>
-              <a:rPr lang="en-US" smtClean="0"/>
+              <a:rPr lang="en-US"/>
               <a:t>Click to edit Master title style</a:t>
             </a:r>
             <a:endParaRPr lang="en-GB"/>
@@ -2970,7 +2970,7 @@
           <a:p>
             <a:pPr lvl="0"/>
             <a:r>
-              <a:rPr lang="en-US" smtClean="0"/>
+              <a:rPr lang="en-US"/>
               <a:t>Click to edit Master text styles</a:t>
             </a:r>
           </a:p>
@@ -2993,7 +2993,7 @@
           <a:p>
             <a:fld id="{E84557DF-487D-4A7D-AC14-41C025B26206}" type="datetimeFigureOut">
               <a:rPr lang="en-GB" smtClean="0"/>
-              <a:t>31/01/2016</a:t>
+              <a:t>11/10/2016</a:t>
             </a:fld>
             <a:endParaRPr lang="en-GB"/>
           </a:p>
@@ -3102,7 +3102,7 @@
           <a:lstStyle/>
           <a:p>
             <a:r>
-              <a:rPr lang="en-US" smtClean="0"/>
+              <a:rPr lang="en-US"/>
               <a:t>Click to edit Master title style</a:t>
             </a:r>
             <a:endParaRPr lang="en-GB"/>
@@ -3136,35 +3136,35 @@
           <a:p>
             <a:pPr lvl="0"/>
             <a:r>
-              <a:rPr lang="en-US" smtClean="0"/>
+              <a:rPr lang="en-US"/>
               <a:t>Click to edit Master text styles</a:t>
             </a:r>
           </a:p>
           <a:p>
             <a:pPr lvl="1"/>
             <a:r>
-              <a:rPr lang="en-US" smtClean="0"/>
+              <a:rPr lang="en-US"/>
               <a:t>Second level</a:t>
             </a:r>
           </a:p>
           <a:p>
             <a:pPr lvl="2"/>
             <a:r>
-              <a:rPr lang="en-US" smtClean="0"/>
+              <a:rPr lang="en-US"/>
               <a:t>Third level</a:t>
             </a:r>
           </a:p>
           <a:p>
             <a:pPr lvl="3"/>
             <a:r>
-              <a:rPr lang="en-US" smtClean="0"/>
+              <a:rPr lang="en-US"/>
               <a:t>Fourth level</a:t>
             </a:r>
           </a:p>
           <a:p>
             <a:pPr lvl="4"/>
             <a:r>
-              <a:rPr lang="en-US" smtClean="0"/>
+              <a:rPr lang="en-US"/>
               <a:t>Fifth level</a:t>
             </a:r>
             <a:endParaRPr lang="en-GB"/>
@@ -3206,7 +3206,7 @@
           <a:p>
             <a:fld id="{E84557DF-487D-4A7D-AC14-41C025B26206}" type="datetimeFigureOut">
               <a:rPr lang="en-GB" smtClean="0"/>
-              <a:t>31/01/2016</a:t>
+              <a:t>11/10/2016</a:t>
             </a:fld>
             <a:endParaRPr lang="en-GB"/>
           </a:p>
@@ -3653,16 +3653,12 @@
           </a:lstStyle>
           <a:p>
             <a:r>
-              <a:rPr lang="en-GB" sz="6000" dirty="0" smtClean="0">
+              <a:rPr lang="en-GB" sz="6000" dirty="0">
                 <a:latin typeface="Arial" panose="020B0604020202020204" pitchFamily="34" charset="0"/>
                 <a:cs typeface="Arial" panose="020B0604020202020204" pitchFamily="34" charset="0"/>
               </a:rPr>
               <a:t>Lake (Island)</a:t>
             </a:r>
-            <a:endParaRPr lang="en-GB" sz="6000" dirty="0">
-              <a:latin typeface="Arial" panose="020B0604020202020204" pitchFamily="34" charset="0"/>
-              <a:cs typeface="Arial" panose="020B0604020202020204" pitchFamily="34" charset="0"/>
-            </a:endParaRPr>
           </a:p>
         </p:txBody>
       </p:sp>
@@ -3689,10 +3685,9 @@
           <a:lstStyle/>
           <a:p>
             <a:r>
-              <a:rPr lang="en-GB" dirty="0" smtClean="0"/>
+              <a:rPr lang="en-GB" dirty="0"/>
               <a:t>The island is only small but in it’s centre is a large, magnificent water feature. From the fountain emanates a fine mist, the way it catches the light makes it glimmer a heavenly gold.</a:t>
             </a:r>
-            <a:endParaRPr lang="en-GB" dirty="0"/>
           </a:p>
         </p:txBody>
       </p:sp>
@@ -3719,16 +3714,15 @@
           <a:lstStyle/>
           <a:p>
             <a:r>
-              <a:rPr lang="en-GB" b="1" dirty="0" smtClean="0"/>
+              <a:rPr lang="en-GB" b="1" dirty="0"/>
               <a:t>Investigate Fountain:</a:t>
             </a:r>
           </a:p>
           <a:p>
             <a:r>
-              <a:rPr lang="en-GB" dirty="0" smtClean="0"/>
+              <a:rPr lang="en-GB" dirty="0"/>
               <a:t>In the stonework at the back of the fountain you see five small indentations. It looks like something is missing.</a:t>
             </a:r>
-            <a:endParaRPr lang="en-GB" dirty="0"/>
           </a:p>
         </p:txBody>
       </p:sp>
@@ -3804,16 +3798,12 @@
           </a:lstStyle>
           <a:p>
             <a:r>
-              <a:rPr lang="en-GB" sz="6000" dirty="0" smtClean="0">
+              <a:rPr lang="en-GB" sz="6000" dirty="0">
                 <a:latin typeface="Arial" panose="020B0604020202020204" pitchFamily="34" charset="0"/>
                 <a:cs typeface="Arial" panose="020B0604020202020204" pitchFamily="34" charset="0"/>
               </a:rPr>
               <a:t>Glacier</a:t>
             </a:r>
-            <a:endParaRPr lang="en-GB" sz="6000" dirty="0">
-              <a:latin typeface="Arial" panose="020B0604020202020204" pitchFamily="34" charset="0"/>
-              <a:cs typeface="Arial" panose="020B0604020202020204" pitchFamily="34" charset="0"/>
-            </a:endParaRPr>
           </a:p>
         </p:txBody>
       </p:sp>
@@ -3839,16 +3829,15 @@
           <a:lstStyle/>
           <a:p>
             <a:r>
-              <a:rPr lang="en-GB" b="1" dirty="0" smtClean="0"/>
+              <a:rPr lang="en-GB" b="1" dirty="0"/>
               <a:t>Use pickaxe on Ice:</a:t>
             </a:r>
           </a:p>
           <a:p>
             <a:r>
-              <a:rPr lang="en-GB" dirty="0" smtClean="0"/>
+              <a:rPr lang="en-GB" dirty="0"/>
               <a:t>As the pickaxe makes contact with the ice, shards fly everywhere. Within the crater created in ice lies a small blue gem stone pulsing with a vibrant blue light. As it is removed from the ice the blizzard instantaneously stops and the air goes still. Mysterious.</a:t>
             </a:r>
-            <a:endParaRPr lang="en-GB" dirty="0"/>
           </a:p>
         </p:txBody>
       </p:sp>
@@ -3874,18 +3863,17 @@
           <a:lstStyle/>
           <a:p>
             <a:r>
-              <a:rPr lang="en-GB" dirty="0" smtClean="0"/>
+              <a:rPr lang="en-GB" dirty="0"/>
               <a:t>The snow topped mountains disappear upwards into the sky in a series of steep ridges and vast </a:t>
             </a:r>
             <a:r>
-              <a:rPr lang="en-GB" dirty="0" err="1" smtClean="0"/>
+              <a:rPr lang="en-GB" dirty="0" err="1"/>
               <a:t>tundras</a:t>
             </a:r>
             <a:r>
-              <a:rPr lang="en-GB" dirty="0" smtClean="0"/>
+              <a:rPr lang="en-GB" dirty="0"/>
               <a:t>. The wind is Icey and bites straight down to the bone. Surely nothing could survive in these freezing conditions.</a:t>
             </a:r>
-            <a:endParaRPr lang="en-GB" dirty="0"/>
           </a:p>
         </p:txBody>
       </p:sp>
@@ -3961,16 +3949,12 @@
           </a:lstStyle>
           <a:p>
             <a:r>
-              <a:rPr lang="en-GB" sz="6000" dirty="0" smtClean="0">
+              <a:rPr lang="en-GB" sz="6000" dirty="0">
                 <a:latin typeface="Arial" panose="020B0604020202020204" pitchFamily="34" charset="0"/>
                 <a:cs typeface="Arial" panose="020B0604020202020204" pitchFamily="34" charset="0"/>
               </a:rPr>
               <a:t>Lake Southwest Shore</a:t>
             </a:r>
-            <a:endParaRPr lang="en-GB" sz="6000" dirty="0">
-              <a:latin typeface="Arial" panose="020B0604020202020204" pitchFamily="34" charset="0"/>
-              <a:cs typeface="Arial" panose="020B0604020202020204" pitchFamily="34" charset="0"/>
-            </a:endParaRPr>
           </a:p>
         </p:txBody>
       </p:sp>
@@ -3996,10 +3980,9 @@
           <a:lstStyle/>
           <a:p>
             <a:r>
-              <a:rPr lang="en-GB" dirty="0" smtClean="0"/>
+              <a:rPr lang="en-GB" dirty="0"/>
               <a:t>The ground underfoot is covered in a fine sand. The air is tranquil, there is no sound other than the gentle lapping of water from the lake against the shore. In the middle of the lake there appears to be a small island, but it is too far away to truly tell.</a:t>
             </a:r>
-            <a:endParaRPr lang="en-GB" dirty="0"/>
           </a:p>
         </p:txBody>
       </p:sp>
@@ -4075,7 +4058,7 @@
           </a:lstStyle>
           <a:p>
             <a:r>
-              <a:rPr lang="en-GB" sz="6000" smtClean="0">
+              <a:rPr lang="en-GB" sz="6000">
                 <a:latin typeface="Arial" panose="020B0604020202020204" pitchFamily="34" charset="0"/>
                 <a:cs typeface="Arial" panose="020B0604020202020204" pitchFamily="34" charset="0"/>
               </a:rPr>
@@ -4110,10 +4093,9 @@
           <a:lstStyle/>
           <a:p>
             <a:r>
-              <a:rPr lang="en-GB" dirty="0" smtClean="0"/>
+              <a:rPr lang="en-GB" dirty="0"/>
               <a:t>The ground underfoot is covered in a mixture of sand and small pebbles. The air is tranquil, there is no sound other than the gentle lapping of water from the lake against the shore. In the middle of the lake there appears to be a small island. The water seems too deep to wade through and there is no visible way to cross.</a:t>
             </a:r>
-            <a:endParaRPr lang="en-GB" dirty="0"/>
           </a:p>
         </p:txBody>
       </p:sp>
@@ -4189,16 +4171,12 @@
           </a:lstStyle>
           <a:p>
             <a:r>
-              <a:rPr lang="en-GB" sz="6000" dirty="0" smtClean="0">
+              <a:rPr lang="en-GB" sz="6000" dirty="0">
                 <a:latin typeface="Arial" panose="020B0604020202020204" pitchFamily="34" charset="0"/>
                 <a:cs typeface="Arial" panose="020B0604020202020204" pitchFamily="34" charset="0"/>
               </a:rPr>
               <a:t>Forrest 4</a:t>
             </a:r>
-            <a:endParaRPr lang="en-GB" sz="6000" dirty="0">
-              <a:latin typeface="Arial" panose="020B0604020202020204" pitchFamily="34" charset="0"/>
-              <a:cs typeface="Arial" panose="020B0604020202020204" pitchFamily="34" charset="0"/>
-            </a:endParaRPr>
           </a:p>
         </p:txBody>
       </p:sp>
@@ -4225,10 +4203,9 @@
           <a:lstStyle/>
           <a:p>
             <a:r>
-              <a:rPr lang="en-GB" dirty="0" smtClean="0"/>
+              <a:rPr lang="en-GB" dirty="0"/>
               <a:t>The forest is dense, the trees are high and their roots run deep. The air is close and the leaves of the trees block out most of the light casting a dark shadow over everything in sight. Some of the trees have damp leaves, but there has been no rain in these parts recently.</a:t>
             </a:r>
-            <a:endParaRPr lang="en-GB" dirty="0"/>
           </a:p>
         </p:txBody>
       </p:sp>
@@ -4304,16 +4281,12 @@
           </a:lstStyle>
           <a:p>
             <a:r>
-              <a:rPr lang="en-GB" sz="6000" dirty="0" smtClean="0">
+              <a:rPr lang="en-GB" sz="6000" dirty="0">
                 <a:latin typeface="Arial" panose="020B0604020202020204" pitchFamily="34" charset="0"/>
                 <a:cs typeface="Arial" panose="020B0604020202020204" pitchFamily="34" charset="0"/>
               </a:rPr>
               <a:t>Lumber Yard</a:t>
             </a:r>
-            <a:endParaRPr lang="en-GB" sz="6000" dirty="0">
-              <a:latin typeface="Arial" panose="020B0604020202020204" pitchFamily="34" charset="0"/>
-              <a:cs typeface="Arial" panose="020B0604020202020204" pitchFamily="34" charset="0"/>
-            </a:endParaRPr>
           </a:p>
         </p:txBody>
       </p:sp>
@@ -4340,10 +4313,9 @@
           <a:lstStyle/>
           <a:p>
             <a:r>
-              <a:rPr lang="en-GB" dirty="0" smtClean="0"/>
+              <a:rPr lang="en-GB" dirty="0"/>
               <a:t>A Graveyard for trees. The ground is covered in saw dust and there are large piles of neatly stacked logs in amongst the tree trunks. Over by the wall of the logging hut is a large stack of crates and tools. Wait! Did one of the creates just Meow?!</a:t>
             </a:r>
-            <a:endParaRPr lang="en-GB" dirty="0"/>
           </a:p>
         </p:txBody>
       </p:sp>
@@ -4419,16 +4391,12 @@
           </a:lstStyle>
           <a:p>
             <a:r>
-              <a:rPr lang="en-GB" sz="6000" dirty="0" smtClean="0">
+              <a:rPr lang="en-GB" sz="6000" dirty="0">
                 <a:latin typeface="Arial" panose="020B0604020202020204" pitchFamily="34" charset="0"/>
                 <a:cs typeface="Arial" panose="020B0604020202020204" pitchFamily="34" charset="0"/>
               </a:rPr>
               <a:t>Forrest 5</a:t>
             </a:r>
-            <a:endParaRPr lang="en-GB" sz="6000" dirty="0">
-              <a:latin typeface="Arial" panose="020B0604020202020204" pitchFamily="34" charset="0"/>
-              <a:cs typeface="Arial" panose="020B0604020202020204" pitchFamily="34" charset="0"/>
-            </a:endParaRPr>
           </a:p>
         </p:txBody>
       </p:sp>
@@ -4455,10 +4423,9 @@
           <a:lstStyle/>
           <a:p>
             <a:r>
-              <a:rPr lang="en-GB" dirty="0" smtClean="0"/>
+              <a:rPr lang="en-GB" dirty="0"/>
               <a:t>The forest is dense, the trees are high and their roots run deep. The air is close and the leaves of the trees block out most of the light casting a dark shadow over everything in sight. Some of the trees appear to be shifting in the flickering light as if something nearby is troubling them.</a:t>
             </a:r>
-            <a:endParaRPr lang="en-GB" dirty="0"/>
           </a:p>
         </p:txBody>
       </p:sp>
@@ -4534,16 +4501,12 @@
           </a:lstStyle>
           <a:p>
             <a:r>
-              <a:rPr lang="en-GB" sz="6000" dirty="0" smtClean="0">
+              <a:rPr lang="en-GB" sz="6000" dirty="0">
                 <a:latin typeface="Arial" panose="020B0604020202020204" pitchFamily="34" charset="0"/>
                 <a:cs typeface="Arial" panose="020B0604020202020204" pitchFamily="34" charset="0"/>
               </a:rPr>
               <a:t>Abandoned Church</a:t>
             </a:r>
-            <a:endParaRPr lang="en-GB" sz="6000" dirty="0">
-              <a:latin typeface="Arial" panose="020B0604020202020204" pitchFamily="34" charset="0"/>
-              <a:cs typeface="Arial" panose="020B0604020202020204" pitchFamily="34" charset="0"/>
-            </a:endParaRPr>
           </a:p>
         </p:txBody>
       </p:sp>
@@ -4570,10 +4533,9 @@
           <a:lstStyle/>
           <a:p>
             <a:r>
-              <a:rPr lang="en-GB" dirty="0" smtClean="0"/>
+              <a:rPr lang="en-GB" dirty="0"/>
               <a:t>This church hasn’t seen use for a very long time. The spire is derelict and everything is covered in a thick layer of dust. Some of the pews appear to have been removed and used as support to prevent the whole building from collapsing.</a:t>
             </a:r>
-            <a:endParaRPr lang="en-GB" dirty="0"/>
           </a:p>
         </p:txBody>
       </p:sp>
@@ -4600,28 +4562,27 @@
           <a:lstStyle/>
           <a:p>
             <a:r>
-              <a:rPr lang="en-GB" b="1" dirty="0" smtClean="0"/>
+              <a:rPr lang="en-GB" b="1" dirty="0"/>
               <a:t>Lectern</a:t>
             </a:r>
           </a:p>
           <a:p>
             <a:r>
-              <a:rPr lang="en-GB" b="1" dirty="0" smtClean="0"/>
+              <a:rPr lang="en-GB" b="1" dirty="0"/>
               <a:t>Organ</a:t>
             </a:r>
           </a:p>
           <a:p>
             <a:r>
-              <a:rPr lang="en-GB" b="1" dirty="0" smtClean="0"/>
+              <a:rPr lang="en-GB" b="1" dirty="0"/>
               <a:t>Cross</a:t>
             </a:r>
           </a:p>
           <a:p>
             <a:r>
-              <a:rPr lang="en-GB" b="1" dirty="0" smtClean="0"/>
+              <a:rPr lang="en-GB" b="1" dirty="0"/>
               <a:t>Font</a:t>
             </a:r>
-            <a:endParaRPr lang="en-GB" b="1" dirty="0"/>
           </a:p>
         </p:txBody>
       </p:sp>
@@ -4697,16 +4658,12 @@
           </a:lstStyle>
           <a:p>
             <a:r>
-              <a:rPr lang="en-GB" sz="6000" dirty="0" smtClean="0">
+              <a:rPr lang="en-GB" sz="6000" dirty="0">
                 <a:latin typeface="Arial" panose="020B0604020202020204" pitchFamily="34" charset="0"/>
                 <a:cs typeface="Arial" panose="020B0604020202020204" pitchFamily="34" charset="0"/>
               </a:rPr>
               <a:t>Hillside 3</a:t>
             </a:r>
-            <a:endParaRPr lang="en-GB" sz="6000" dirty="0">
-              <a:latin typeface="Arial" panose="020B0604020202020204" pitchFamily="34" charset="0"/>
-              <a:cs typeface="Arial" panose="020B0604020202020204" pitchFamily="34" charset="0"/>
-            </a:endParaRPr>
           </a:p>
         </p:txBody>
       </p:sp>
@@ -4733,10 +4690,9 @@
           <a:lstStyle/>
           <a:p>
             <a:r>
-              <a:rPr lang="en-GB" dirty="0" smtClean="0"/>
+              <a:rPr lang="en-GB" dirty="0"/>
               <a:t>A sprawl of rolling hills cover the land. There is a gentle breeze blowing calmly across the slopes and the sun shines warmly illuminating the hillside in a pale golden light. In the distance to the east is the spectacular sight of enormous white topped mountains towering above the landscape.</a:t>
             </a:r>
-            <a:endParaRPr lang="en-GB" dirty="0"/>
           </a:p>
         </p:txBody>
       </p:sp>
@@ -4812,16 +4768,12 @@
           </a:lstStyle>
           <a:p>
             <a:r>
-              <a:rPr lang="en-GB" sz="6000" dirty="0" smtClean="0">
+              <a:rPr lang="en-GB" sz="6000" dirty="0">
                 <a:latin typeface="Arial" panose="020B0604020202020204" pitchFamily="34" charset="0"/>
                 <a:cs typeface="Arial" panose="020B0604020202020204" pitchFamily="34" charset="0"/>
               </a:rPr>
               <a:t>Mountains 3</a:t>
             </a:r>
-            <a:endParaRPr lang="en-GB" sz="6000" dirty="0">
-              <a:latin typeface="Arial" panose="020B0604020202020204" pitchFamily="34" charset="0"/>
-              <a:cs typeface="Arial" panose="020B0604020202020204" pitchFamily="34" charset="0"/>
-            </a:endParaRPr>
           </a:p>
         </p:txBody>
       </p:sp>
@@ -4847,18 +4799,17 @@
           <a:lstStyle/>
           <a:p>
             <a:r>
-              <a:rPr lang="en-GB" dirty="0" smtClean="0"/>
+              <a:rPr lang="en-GB" dirty="0"/>
               <a:t>The snow topped mountains disappear upwards into the sky in a series of steep ridges and vast </a:t>
             </a:r>
             <a:r>
-              <a:rPr lang="en-GB" dirty="0" err="1" smtClean="0"/>
+              <a:rPr lang="en-GB" dirty="0" err="1"/>
               <a:t>tundras</a:t>
             </a:r>
             <a:r>
-              <a:rPr lang="en-GB" dirty="0" smtClean="0"/>
+              <a:rPr lang="en-GB" dirty="0"/>
               <a:t>. You feel a distinct chill in the air and can hear the faint rumble of thunder from the grey storm clouds to north. </a:t>
             </a:r>
-            <a:endParaRPr lang="en-GB" dirty="0"/>
           </a:p>
         </p:txBody>
       </p:sp>
@@ -4934,16 +4885,12 @@
           </a:lstStyle>
           <a:p>
             <a:r>
-              <a:rPr lang="en-GB" sz="6000" dirty="0" smtClean="0">
+              <a:rPr lang="en-GB" sz="6000" dirty="0">
                 <a:latin typeface="Arial" panose="020B0604020202020204" pitchFamily="34" charset="0"/>
                 <a:cs typeface="Arial" panose="020B0604020202020204" pitchFamily="34" charset="0"/>
               </a:rPr>
               <a:t>Mountains 4</a:t>
             </a:r>
-            <a:endParaRPr lang="en-GB" sz="6000" dirty="0">
-              <a:latin typeface="Arial" panose="020B0604020202020204" pitchFamily="34" charset="0"/>
-              <a:cs typeface="Arial" panose="020B0604020202020204" pitchFamily="34" charset="0"/>
-            </a:endParaRPr>
           </a:p>
         </p:txBody>
       </p:sp>
@@ -4969,18 +4916,17 @@
           <a:lstStyle/>
           <a:p>
             <a:r>
-              <a:rPr lang="en-GB" dirty="0" smtClean="0"/>
+              <a:rPr lang="en-GB" dirty="0"/>
               <a:t>The snow topped mountains disappear upwards into the sky in a series of steep ridges and vast </a:t>
             </a:r>
             <a:r>
-              <a:rPr lang="en-GB" dirty="0" err="1" smtClean="0"/>
+              <a:rPr lang="en-GB" dirty="0" err="1"/>
               <a:t>tundras</a:t>
             </a:r>
             <a:r>
-              <a:rPr lang="en-GB" dirty="0" smtClean="0"/>
+              <a:rPr lang="en-GB" dirty="0"/>
               <a:t>. You feel a distinct chill in the air and can hear the faint rumble of thunder from the grey storm clouds to north. The jagged rocks all start to look very similar. If a tired adventurer was not careful they could easily lose their way.</a:t>
             </a:r>
-            <a:endParaRPr lang="en-GB" dirty="0"/>
           </a:p>
         </p:txBody>
       </p:sp>
@@ -5056,16 +5002,12 @@
           </a:lstStyle>
           <a:p>
             <a:r>
-              <a:rPr lang="en-GB" sz="6000" dirty="0" smtClean="0">
+              <a:rPr lang="en-GB" sz="6000" dirty="0">
                 <a:latin typeface="Arial" panose="020B0604020202020204" pitchFamily="34" charset="0"/>
                 <a:cs typeface="Arial" panose="020B0604020202020204" pitchFamily="34" charset="0"/>
               </a:rPr>
               <a:t>Lake North Shore</a:t>
             </a:r>
-            <a:endParaRPr lang="en-GB" sz="6000" dirty="0">
-              <a:latin typeface="Arial" panose="020B0604020202020204" pitchFamily="34" charset="0"/>
-              <a:cs typeface="Arial" panose="020B0604020202020204" pitchFamily="34" charset="0"/>
-            </a:endParaRPr>
           </a:p>
         </p:txBody>
       </p:sp>
@@ -5092,10 +5034,9 @@
           <a:lstStyle/>
           <a:p>
             <a:r>
-              <a:rPr lang="en-GB" dirty="0" smtClean="0"/>
+              <a:rPr lang="en-GB" dirty="0"/>
               <a:t>The ground underfoot is covered in small pebbles. The air is tranquil, there is no sound other than the gentle lapping of water from the lake against the shore. In the middle of the lake there appears to be a small island. At one end of the beach is a large rock surround by 13 smaller ones forming a perfect circle.</a:t>
             </a:r>
-            <a:endParaRPr lang="en-GB" dirty="0"/>
           </a:p>
         </p:txBody>
       </p:sp>
@@ -5121,16 +5062,15 @@
           <a:lstStyle/>
           <a:p>
             <a:r>
-              <a:rPr lang="en-GB" b="1" dirty="0" smtClean="0"/>
+              <a:rPr lang="en-GB" b="1" dirty="0"/>
               <a:t>Press large rock:</a:t>
             </a:r>
           </a:p>
           <a:p>
             <a:r>
-              <a:rPr lang="en-GB" dirty="0" smtClean="0"/>
+              <a:rPr lang="en-GB" dirty="0"/>
               <a:t>A series of large stepping stones slowly rise up from lakes bed. They lead across the lake to the island at it’s centre.</a:t>
             </a:r>
-            <a:endParaRPr lang="en-GB" dirty="0"/>
           </a:p>
         </p:txBody>
       </p:sp>
@@ -5206,16 +5146,12 @@
           </a:lstStyle>
           <a:p>
             <a:r>
-              <a:rPr lang="en-GB" sz="6000" dirty="0" smtClean="0">
+              <a:rPr lang="en-GB" sz="6000" dirty="0">
                 <a:latin typeface="Arial" panose="020B0604020202020204" pitchFamily="34" charset="0"/>
                 <a:cs typeface="Arial" panose="020B0604020202020204" pitchFamily="34" charset="0"/>
               </a:rPr>
               <a:t>Mountains 5</a:t>
             </a:r>
-            <a:endParaRPr lang="en-GB" sz="6000" dirty="0">
-              <a:latin typeface="Arial" panose="020B0604020202020204" pitchFamily="34" charset="0"/>
-              <a:cs typeface="Arial" panose="020B0604020202020204" pitchFamily="34" charset="0"/>
-            </a:endParaRPr>
           </a:p>
         </p:txBody>
       </p:sp>
@@ -5241,18 +5177,17 @@
           <a:lstStyle/>
           <a:p>
             <a:r>
-              <a:rPr lang="en-GB" dirty="0" smtClean="0"/>
+              <a:rPr lang="en-GB" dirty="0"/>
               <a:t>The snow topped mountains disappear upwards into the sky in a series of steep ridges and vast </a:t>
             </a:r>
             <a:r>
-              <a:rPr lang="en-GB" dirty="0" err="1" smtClean="0"/>
+              <a:rPr lang="en-GB" dirty="0" err="1"/>
               <a:t>tundras</a:t>
             </a:r>
             <a:r>
-              <a:rPr lang="en-GB" dirty="0" smtClean="0"/>
+              <a:rPr lang="en-GB" dirty="0"/>
               <a:t>. You feel a distinct chill in the air and can hear the faint rumble of thunder from the grey storm clouds to north. The mountains appear continue endlessly in a maze of jagged rocks. There is nothing out in this barren frozen landscape apart from Ice and Snow.</a:t>
             </a:r>
-            <a:endParaRPr lang="en-GB" dirty="0"/>
           </a:p>
         </p:txBody>
       </p:sp>
@@ -5328,16 +5263,12 @@
           </a:lstStyle>
           <a:p>
             <a:r>
-              <a:rPr lang="en-GB" sz="6000" dirty="0" smtClean="0">
+              <a:rPr lang="en-GB" sz="6000" dirty="0">
                 <a:latin typeface="Arial" panose="020B0604020202020204" pitchFamily="34" charset="0"/>
                 <a:cs typeface="Arial" panose="020B0604020202020204" pitchFamily="34" charset="0"/>
               </a:rPr>
               <a:t>Forrest 6</a:t>
             </a:r>
-            <a:endParaRPr lang="en-GB" sz="6000" dirty="0">
-              <a:latin typeface="Arial" panose="020B0604020202020204" pitchFamily="34" charset="0"/>
-              <a:cs typeface="Arial" panose="020B0604020202020204" pitchFamily="34" charset="0"/>
-            </a:endParaRPr>
           </a:p>
         </p:txBody>
       </p:sp>
@@ -5364,10 +5295,9 @@
           <a:lstStyle/>
           <a:p>
             <a:r>
-              <a:rPr lang="en-GB" dirty="0" smtClean="0"/>
+              <a:rPr lang="en-GB" dirty="0"/>
               <a:t>The forest is dense, the trees are high and their roots run deep. The air is close and the leaves of the trees block out most of the light casting a dark shadow over everything in sight. At the base of a particularly large tree is a very soft patch moss just below a whole in the trunk. </a:t>
             </a:r>
-            <a:endParaRPr lang="en-GB" dirty="0"/>
           </a:p>
         </p:txBody>
       </p:sp>
@@ -5443,16 +5373,12 @@
           </a:lstStyle>
           <a:p>
             <a:r>
-              <a:rPr lang="en-GB" sz="6000" dirty="0" smtClean="0">
+              <a:rPr lang="en-GB" sz="6000" dirty="0">
                 <a:latin typeface="Arial" panose="020B0604020202020204" pitchFamily="34" charset="0"/>
                 <a:cs typeface="Arial" panose="020B0604020202020204" pitchFamily="34" charset="0"/>
               </a:rPr>
               <a:t>Forrest 7</a:t>
             </a:r>
-            <a:endParaRPr lang="en-GB" sz="6000" dirty="0">
-              <a:latin typeface="Arial" panose="020B0604020202020204" pitchFamily="34" charset="0"/>
-              <a:cs typeface="Arial" panose="020B0604020202020204" pitchFamily="34" charset="0"/>
-            </a:endParaRPr>
           </a:p>
         </p:txBody>
       </p:sp>
@@ -5479,10 +5405,9 @@
           <a:lstStyle/>
           <a:p>
             <a:r>
-              <a:rPr lang="en-GB" dirty="0" smtClean="0"/>
+              <a:rPr lang="en-GB" dirty="0"/>
               <a:t>The forest is dense, the trees are high and their roots run deep. The air is close and the leaves of the trees block out most of the light casting a dark shadow over everything in sight. The groans and creaks of the great old trees sounds oddly like they are communicating with one another.</a:t>
             </a:r>
-            <a:endParaRPr lang="en-GB" dirty="0"/>
           </a:p>
         </p:txBody>
       </p:sp>
@@ -5558,16 +5483,12 @@
           </a:lstStyle>
           <a:p>
             <a:r>
-              <a:rPr lang="en-GB" sz="6000" dirty="0" smtClean="0">
+              <a:rPr lang="en-GB" sz="6000" dirty="0">
                 <a:latin typeface="Arial" panose="020B0604020202020204" pitchFamily="34" charset="0"/>
                 <a:cs typeface="Arial" panose="020B0604020202020204" pitchFamily="34" charset="0"/>
               </a:rPr>
               <a:t>Forrest 8</a:t>
             </a:r>
-            <a:endParaRPr lang="en-GB" sz="6000" dirty="0">
-              <a:latin typeface="Arial" panose="020B0604020202020204" pitchFamily="34" charset="0"/>
-              <a:cs typeface="Arial" panose="020B0604020202020204" pitchFamily="34" charset="0"/>
-            </a:endParaRPr>
           </a:p>
         </p:txBody>
       </p:sp>
@@ -5594,10 +5515,9 @@
           <a:lstStyle/>
           <a:p>
             <a:r>
-              <a:rPr lang="en-GB" dirty="0" smtClean="0"/>
+              <a:rPr lang="en-GB" dirty="0"/>
               <a:t>The forest is dense, the trees are high and their roots run deep. The air is close and the leaves of the trees block out most of the light casting a dark shadow over everything in sight. The twisted bark and patterns in the lichen on the trees somehow look like faces.</a:t>
             </a:r>
-            <a:endParaRPr lang="en-GB" dirty="0"/>
           </a:p>
         </p:txBody>
       </p:sp>
@@ -5673,16 +5593,12 @@
           </a:lstStyle>
           <a:p>
             <a:r>
-              <a:rPr lang="en-GB" sz="6000" dirty="0" smtClean="0">
+              <a:rPr lang="en-GB" sz="6000" dirty="0">
                 <a:latin typeface="Arial" panose="020B0604020202020204" pitchFamily="34" charset="0"/>
                 <a:cs typeface="Arial" panose="020B0604020202020204" pitchFamily="34" charset="0"/>
               </a:rPr>
               <a:t>Logging Hut</a:t>
             </a:r>
-            <a:endParaRPr lang="en-GB" sz="6000" dirty="0">
-              <a:latin typeface="Arial" panose="020B0604020202020204" pitchFamily="34" charset="0"/>
-              <a:cs typeface="Arial" panose="020B0604020202020204" pitchFamily="34" charset="0"/>
-            </a:endParaRPr>
           </a:p>
         </p:txBody>
       </p:sp>
@@ -5709,10 +5625,9 @@
           <a:lstStyle/>
           <a:p>
             <a:r>
-              <a:rPr lang="en-GB" dirty="0" smtClean="0"/>
+              <a:rPr lang="en-GB" dirty="0"/>
               <a:t>Inside the hut is a warm hearth and a table covered in a variety of roasted meats and different cheese’s. Hung on one of the walls is the head of a large elk above a mantle piece. The constant coming and going of loggers means there is never a dull moment in this seemingly innocent lumberjack community.</a:t>
             </a:r>
-            <a:endParaRPr lang="en-GB" dirty="0"/>
           </a:p>
         </p:txBody>
       </p:sp>
@@ -5788,16 +5703,12 @@
           </a:lstStyle>
           <a:p>
             <a:r>
-              <a:rPr lang="en-GB" sz="6000" dirty="0" smtClean="0">
+              <a:rPr lang="en-GB" sz="6000" dirty="0">
                 <a:latin typeface="Arial" panose="020B0604020202020204" pitchFamily="34" charset="0"/>
                 <a:cs typeface="Arial" panose="020B0604020202020204" pitchFamily="34" charset="0"/>
               </a:rPr>
               <a:t>Forrest 9</a:t>
             </a:r>
-            <a:endParaRPr lang="en-GB" sz="6000" dirty="0">
-              <a:latin typeface="Arial" panose="020B0604020202020204" pitchFamily="34" charset="0"/>
-              <a:cs typeface="Arial" panose="020B0604020202020204" pitchFamily="34" charset="0"/>
-            </a:endParaRPr>
           </a:p>
         </p:txBody>
       </p:sp>
@@ -5824,10 +5735,9 @@
           <a:lstStyle/>
           <a:p>
             <a:r>
-              <a:rPr lang="en-GB" dirty="0" smtClean="0"/>
+              <a:rPr lang="en-GB" dirty="0"/>
               <a:t>The forest is dense, the trees are high and their roots run deep. The air is close and the leaves of the trees block out most of the light casting a dark shadow over everything in sight. The trees somehow seem restless, something nearby must be disturbing them.</a:t>
             </a:r>
-            <a:endParaRPr lang="en-GB" dirty="0"/>
           </a:p>
         </p:txBody>
       </p:sp>
@@ -5903,16 +5813,12 @@
           </a:lstStyle>
           <a:p>
             <a:r>
-              <a:rPr lang="en-GB" sz="6000" dirty="0" smtClean="0">
+              <a:rPr lang="en-GB" sz="6000" dirty="0">
                 <a:latin typeface="Arial" panose="020B0604020202020204" pitchFamily="34" charset="0"/>
                 <a:cs typeface="Arial" panose="020B0604020202020204" pitchFamily="34" charset="0"/>
               </a:rPr>
               <a:t>Overgrown Garden</a:t>
             </a:r>
-            <a:endParaRPr lang="en-GB" sz="6000" dirty="0">
-              <a:latin typeface="Arial" panose="020B0604020202020204" pitchFamily="34" charset="0"/>
-              <a:cs typeface="Arial" panose="020B0604020202020204" pitchFamily="34" charset="0"/>
-            </a:endParaRPr>
           </a:p>
         </p:txBody>
       </p:sp>
@@ -5939,10 +5845,9 @@
           <a:lstStyle/>
           <a:p>
             <a:r>
-              <a:rPr lang="en-GB" dirty="0" smtClean="0"/>
+              <a:rPr lang="en-GB" dirty="0"/>
               <a:t>Once a beautiful garden, with a wide variety of exotic plants, all that is left is an overgrown mess of vines and weeds. Everything is covered in a dense layer of dead foliage and anything which once made this a garden is all but lost. Many walls have collapsed as the weeds have taken over.</a:t>
             </a:r>
-            <a:endParaRPr lang="en-GB" dirty="0"/>
           </a:p>
         </p:txBody>
       </p:sp>
@@ -6018,16 +5923,12 @@
           </a:lstStyle>
           <a:p>
             <a:r>
-              <a:rPr lang="en-GB" sz="6000" dirty="0" smtClean="0">
+              <a:rPr lang="en-GB" sz="6000" dirty="0">
                 <a:latin typeface="Arial" panose="020B0604020202020204" pitchFamily="34" charset="0"/>
                 <a:cs typeface="Arial" panose="020B0604020202020204" pitchFamily="34" charset="0"/>
               </a:rPr>
               <a:t>Hillside 2</a:t>
             </a:r>
-            <a:endParaRPr lang="en-GB" sz="6000" dirty="0">
-              <a:latin typeface="Arial" panose="020B0604020202020204" pitchFamily="34" charset="0"/>
-              <a:cs typeface="Arial" panose="020B0604020202020204" pitchFamily="34" charset="0"/>
-            </a:endParaRPr>
           </a:p>
         </p:txBody>
       </p:sp>
@@ -6054,10 +5955,9 @@
           <a:lstStyle/>
           <a:p>
             <a:r>
-              <a:rPr lang="en-GB" dirty="0" smtClean="0"/>
+              <a:rPr lang="en-GB" dirty="0"/>
               <a:t>A sprawl of rolling hills cover the land. There is a gentle breeze blowing calmly across the slopes and the sun shines warmly illuminating the hillside in a pale golden light. Small creatures and birds can be seen darting around in the warm glow of the mid day sun. </a:t>
             </a:r>
-            <a:endParaRPr lang="en-GB" dirty="0"/>
           </a:p>
         </p:txBody>
       </p:sp>
@@ -6133,16 +6033,12 @@
           </a:lstStyle>
           <a:p>
             <a:r>
-              <a:rPr lang="en-GB" sz="6000" dirty="0" smtClean="0">
+              <a:rPr lang="en-GB" sz="6000" dirty="0">
                 <a:latin typeface="Arial" panose="020B0604020202020204" pitchFamily="34" charset="0"/>
                 <a:cs typeface="Arial" panose="020B0604020202020204" pitchFamily="34" charset="0"/>
               </a:rPr>
               <a:t>Valley (of Death)</a:t>
             </a:r>
-            <a:endParaRPr lang="en-GB" sz="6000" dirty="0">
-              <a:latin typeface="Arial" panose="020B0604020202020204" pitchFamily="34" charset="0"/>
-              <a:cs typeface="Arial" panose="020B0604020202020204" pitchFamily="34" charset="0"/>
-            </a:endParaRPr>
           </a:p>
         </p:txBody>
       </p:sp>
@@ -6169,10 +6065,9 @@
           <a:lstStyle/>
           <a:p>
             <a:r>
-              <a:rPr lang="en-GB" dirty="0" smtClean="0"/>
+              <a:rPr lang="en-GB" dirty="0"/>
               <a:t>Although a faint draught can be felt blowing through the valley, it remains filled by a dense unnatural mist. The mist is so thick that it is impossible to see more than a couple of feet in any direction. The looming rocks of the valley walls lunge out of the mist like giant stone gargoyles. </a:t>
             </a:r>
-            <a:endParaRPr lang="en-GB" dirty="0"/>
           </a:p>
         </p:txBody>
       </p:sp>
@@ -6248,16 +6143,12 @@
           </a:lstStyle>
           <a:p>
             <a:r>
-              <a:rPr lang="en-GB" sz="6000" dirty="0" smtClean="0">
+              <a:rPr lang="en-GB" sz="6000" dirty="0">
                 <a:latin typeface="Arial" panose="020B0604020202020204" pitchFamily="34" charset="0"/>
                 <a:cs typeface="Arial" panose="020B0604020202020204" pitchFamily="34" charset="0"/>
               </a:rPr>
               <a:t>Hillside 1</a:t>
             </a:r>
-            <a:endParaRPr lang="en-GB" sz="6000" dirty="0">
-              <a:latin typeface="Arial" panose="020B0604020202020204" pitchFamily="34" charset="0"/>
-              <a:cs typeface="Arial" panose="020B0604020202020204" pitchFamily="34" charset="0"/>
-            </a:endParaRPr>
           </a:p>
         </p:txBody>
       </p:sp>
@@ -6284,10 +6175,9 @@
           <a:lstStyle/>
           <a:p>
             <a:r>
-              <a:rPr lang="en-GB" dirty="0" smtClean="0"/>
+              <a:rPr lang="en-GB" dirty="0"/>
               <a:t>A sprawl of rolling hills cover the land. There is a gentle breeze blowing calmly across the slopes and the sun shines warmly illuminating the hillside in a pale golden light. On the top of one of the hills is a mysterious ring of mushrooms with a number of small animal tracks that lead a short distance away before mysteriously vanishing. </a:t>
             </a:r>
-            <a:endParaRPr lang="en-GB" dirty="0"/>
           </a:p>
         </p:txBody>
       </p:sp>
@@ -6363,16 +6253,12 @@
           </a:lstStyle>
           <a:p>
             <a:r>
-              <a:rPr lang="en-GB" sz="6000" dirty="0" smtClean="0">
+              <a:rPr lang="en-GB" sz="6000" dirty="0">
                 <a:latin typeface="Arial" panose="020B0604020202020204" pitchFamily="34" charset="0"/>
                 <a:cs typeface="Arial" panose="020B0604020202020204" pitchFamily="34" charset="0"/>
               </a:rPr>
               <a:t>Forest 1</a:t>
             </a:r>
-            <a:endParaRPr lang="en-GB" sz="6000" dirty="0">
-              <a:latin typeface="Arial" panose="020B0604020202020204" pitchFamily="34" charset="0"/>
-              <a:cs typeface="Arial" panose="020B0604020202020204" pitchFamily="34" charset="0"/>
-            </a:endParaRPr>
           </a:p>
         </p:txBody>
       </p:sp>
@@ -6399,10 +6285,9 @@
           <a:lstStyle/>
           <a:p>
             <a:r>
-              <a:rPr lang="en-GB" dirty="0" smtClean="0"/>
+              <a:rPr lang="en-GB" dirty="0"/>
               <a:t>The forest is dense, the trees are high and their roots run deep. The air is close and the leaves of the trees block out most of the light casting a dark shadow over everything in sight. When the wind drops and the leaves stop rustling sometimes a faint sound of water can be heard.</a:t>
             </a:r>
-            <a:endParaRPr lang="en-GB" dirty="0"/>
           </a:p>
         </p:txBody>
       </p:sp>
@@ -6478,16 +6363,12 @@
           </a:lstStyle>
           <a:p>
             <a:r>
-              <a:rPr lang="en-GB" sz="6000" dirty="0" smtClean="0">
+              <a:rPr lang="en-GB" sz="6000" dirty="0">
                 <a:latin typeface="Arial" panose="020B0604020202020204" pitchFamily="34" charset="0"/>
                 <a:cs typeface="Arial" panose="020B0604020202020204" pitchFamily="34" charset="0"/>
               </a:rPr>
               <a:t>Waterfall</a:t>
             </a:r>
-            <a:endParaRPr lang="en-GB" sz="6000" dirty="0">
-              <a:latin typeface="Arial" panose="020B0604020202020204" pitchFamily="34" charset="0"/>
-              <a:cs typeface="Arial" panose="020B0604020202020204" pitchFamily="34" charset="0"/>
-            </a:endParaRPr>
           </a:p>
         </p:txBody>
       </p:sp>
@@ -6514,10 +6395,9 @@
           <a:lstStyle/>
           <a:p>
             <a:r>
-              <a:rPr lang="en-GB" dirty="0" smtClean="0"/>
+              <a:rPr lang="en-GB" dirty="0"/>
               <a:t>This magnificent waterfall is a true spectacle to behold. The fine spray coming off it catches the light in such a way that the a rainbow resides above it, permanently, as a dazzling crown of colour. At the top of a small path, winding it’s way up the side of the waterfall, a large rock juts out from the torrential downpour of water.</a:t>
             </a:r>
-            <a:endParaRPr lang="en-GB" dirty="0"/>
           </a:p>
         </p:txBody>
       </p:sp>
@@ -6593,16 +6473,12 @@
           </a:lstStyle>
           <a:p>
             <a:r>
-              <a:rPr lang="en-GB" sz="6000" dirty="0" smtClean="0">
+              <a:rPr lang="en-GB" sz="6000" dirty="0">
                 <a:latin typeface="Arial" panose="020B0604020202020204" pitchFamily="34" charset="0"/>
                 <a:cs typeface="Arial" panose="020B0604020202020204" pitchFamily="34" charset="0"/>
               </a:rPr>
               <a:t>Forest 14</a:t>
             </a:r>
-            <a:endParaRPr lang="en-GB" sz="6000" dirty="0">
-              <a:latin typeface="Arial" panose="020B0604020202020204" pitchFamily="34" charset="0"/>
-              <a:cs typeface="Arial" panose="020B0604020202020204" pitchFamily="34" charset="0"/>
-            </a:endParaRPr>
           </a:p>
         </p:txBody>
       </p:sp>
@@ -6629,10 +6505,9 @@
           <a:lstStyle/>
           <a:p>
             <a:r>
-              <a:rPr lang="en-GB" dirty="0" smtClean="0"/>
+              <a:rPr lang="en-GB" dirty="0"/>
               <a:t>The tall pine trees on the outskirts of this vast forest sway gently in the wind. The woodland here seems friendly and inviting, but deeper in, the tops of the trees writhe and move like something inside is stirring. Squirrels and other small animals can be seen darting around, going about their business amongst the foliage. </a:t>
             </a:r>
-            <a:endParaRPr lang="en-GB" dirty="0"/>
           </a:p>
         </p:txBody>
       </p:sp>
@@ -6708,16 +6583,12 @@
           </a:lstStyle>
           <a:p>
             <a:r>
-              <a:rPr lang="en-GB" sz="6000" dirty="0" smtClean="0">
+              <a:rPr lang="en-GB" sz="6000" dirty="0">
                 <a:latin typeface="Arial" panose="020B0604020202020204" pitchFamily="34" charset="0"/>
                 <a:cs typeface="Arial" panose="020B0604020202020204" pitchFamily="34" charset="0"/>
               </a:rPr>
               <a:t>Forrest 13</a:t>
             </a:r>
-            <a:endParaRPr lang="en-GB" sz="6000" dirty="0">
-              <a:latin typeface="Arial" panose="020B0604020202020204" pitchFamily="34" charset="0"/>
-              <a:cs typeface="Arial" panose="020B0604020202020204" pitchFamily="34" charset="0"/>
-            </a:endParaRPr>
           </a:p>
         </p:txBody>
       </p:sp>
@@ -6744,10 +6615,9 @@
           <a:lstStyle/>
           <a:p>
             <a:r>
-              <a:rPr lang="en-GB" dirty="0" smtClean="0"/>
+              <a:rPr lang="en-GB" dirty="0"/>
               <a:t>The tall pine trees on the outskirts of this vast forest sway gently in the wind. The woodland here seems friendly and inviting, but deeper in, the tops of the trees writhe and move like something inside is stirring. Wild mushrooms can be seen growing at the bases of the trees, they grow to unnatural sizes like they have some sort of miracle fertiliser. The farmer would love to get this hands on some of that! </a:t>
             </a:r>
-            <a:endParaRPr lang="en-GB" dirty="0"/>
           </a:p>
         </p:txBody>
       </p:sp>
@@ -6823,16 +6693,12 @@
           </a:lstStyle>
           <a:p>
             <a:r>
-              <a:rPr lang="en-GB" sz="6000" dirty="0" smtClean="0">
+              <a:rPr lang="en-GB" sz="6000" dirty="0">
                 <a:latin typeface="Arial" panose="020B0604020202020204" pitchFamily="34" charset="0"/>
                 <a:cs typeface="Arial" panose="020B0604020202020204" pitchFamily="34" charset="0"/>
               </a:rPr>
               <a:t>Forrest 12</a:t>
             </a:r>
-            <a:endParaRPr lang="en-GB" sz="6000" dirty="0">
-              <a:latin typeface="Arial" panose="020B0604020202020204" pitchFamily="34" charset="0"/>
-              <a:cs typeface="Arial" panose="020B0604020202020204" pitchFamily="34" charset="0"/>
-            </a:endParaRPr>
           </a:p>
         </p:txBody>
       </p:sp>
@@ -6859,10 +6725,9 @@
           <a:lstStyle/>
           <a:p>
             <a:r>
-              <a:rPr lang="en-GB" dirty="0" smtClean="0"/>
+              <a:rPr lang="en-GB" dirty="0"/>
               <a:t>The tall pine trees on the outskirts of this vast forest sway gently in the wind. The woodland here seems friendly and inviting, but deeper in, the tops of the trees writhe and move like something inside is stirring. Somewhere up in the branches of one of the trees nearby, the sound of a sparrow cracking an acorn against a branch reverberates around the tree tops.  </a:t>
             </a:r>
-            <a:endParaRPr lang="en-GB" dirty="0"/>
           </a:p>
         </p:txBody>
       </p:sp>
@@ -6938,16 +6803,12 @@
           </a:lstStyle>
           <a:p>
             <a:r>
-              <a:rPr lang="en-GB" sz="6000" dirty="0" smtClean="0">
+              <a:rPr lang="en-GB" sz="6000" dirty="0">
                 <a:latin typeface="Arial" panose="020B0604020202020204" pitchFamily="34" charset="0"/>
                 <a:cs typeface="Arial" panose="020B0604020202020204" pitchFamily="34" charset="0"/>
               </a:rPr>
               <a:t>Forrest 11</a:t>
             </a:r>
-            <a:endParaRPr lang="en-GB" sz="6000" dirty="0">
-              <a:latin typeface="Arial" panose="020B0604020202020204" pitchFamily="34" charset="0"/>
-              <a:cs typeface="Arial" panose="020B0604020202020204" pitchFamily="34" charset="0"/>
-            </a:endParaRPr>
           </a:p>
         </p:txBody>
       </p:sp>
@@ -6974,10 +6835,9 @@
           <a:lstStyle/>
           <a:p>
             <a:r>
-              <a:rPr lang="en-GB" dirty="0" smtClean="0"/>
+              <a:rPr lang="en-GB" dirty="0"/>
               <a:t>The tall pine trees on the outskirts of this vast forest sway gently in the wind. The woodland here seems friendly and inviting, but deeper in, the tops of the trees writhe and move like something inside is stirring. High atop the pines the occasional buzzard can be seen soaring on the draughts of hot air looking for prey. </a:t>
             </a:r>
-            <a:endParaRPr lang="en-GB" dirty="0"/>
           </a:p>
         </p:txBody>
       </p:sp>
@@ -7053,16 +6913,12 @@
           </a:lstStyle>
           <a:p>
             <a:r>
-              <a:rPr lang="en-GB" sz="6000" dirty="0" smtClean="0">
+              <a:rPr lang="en-GB" sz="6000" dirty="0">
                 <a:latin typeface="Arial" panose="020B0604020202020204" pitchFamily="34" charset="0"/>
                 <a:cs typeface="Arial" panose="020B0604020202020204" pitchFamily="34" charset="0"/>
               </a:rPr>
               <a:t>Forrest 10</a:t>
             </a:r>
-            <a:endParaRPr lang="en-GB" sz="6000" dirty="0">
-              <a:latin typeface="Arial" panose="020B0604020202020204" pitchFamily="34" charset="0"/>
-              <a:cs typeface="Arial" panose="020B0604020202020204" pitchFamily="34" charset="0"/>
-            </a:endParaRPr>
           </a:p>
         </p:txBody>
       </p:sp>
@@ -7089,10 +6945,9 @@
           <a:lstStyle/>
           <a:p>
             <a:r>
-              <a:rPr lang="en-GB" dirty="0" smtClean="0"/>
+              <a:rPr lang="en-GB" dirty="0"/>
               <a:t>The tall pine trees on the outskirts of this vast forest sway gently in the wind. The woodland here seems friendly and inviting, but deeper in, the tops of the trees writhe and move like something inside is stirring. Birds can be seen nesting amongst the branches and foxes build their dens in the spaces at the bottoms of the trunks.</a:t>
             </a:r>
-            <a:endParaRPr lang="en-GB" dirty="0"/>
           </a:p>
         </p:txBody>
       </p:sp>
@@ -7168,16 +7023,12 @@
           </a:lstStyle>
           <a:p>
             <a:r>
-              <a:rPr lang="en-GB" sz="6000" dirty="0" smtClean="0">
+              <a:rPr lang="en-GB" sz="6000" dirty="0">
                 <a:latin typeface="Arial" panose="020B0604020202020204" pitchFamily="34" charset="0"/>
                 <a:cs typeface="Arial" panose="020B0604020202020204" pitchFamily="34" charset="0"/>
               </a:rPr>
               <a:t>Overgrown Junction</a:t>
             </a:r>
-            <a:endParaRPr lang="en-GB" sz="6000" dirty="0">
-              <a:latin typeface="Arial" panose="020B0604020202020204" pitchFamily="34" charset="0"/>
-              <a:cs typeface="Arial" panose="020B0604020202020204" pitchFamily="34" charset="0"/>
-            </a:endParaRPr>
           </a:p>
         </p:txBody>
       </p:sp>
@@ -7204,10 +7055,9 @@
           <a:lstStyle/>
           <a:p>
             <a:r>
-              <a:rPr lang="en-GB" dirty="0" smtClean="0"/>
+              <a:rPr lang="en-GB" dirty="0"/>
               <a:t>This once bustling and busy junction is now all but dead, the trade caravans and local merchants stopped coming here long ago. Now all that is left is some overgrown verges and a road cracked and broken by weeds and the slow decay of time.</a:t>
             </a:r>
-            <a:endParaRPr lang="en-GB" dirty="0"/>
           </a:p>
         </p:txBody>
       </p:sp>
@@ -7283,16 +7133,12 @@
           </a:lstStyle>
           <a:p>
             <a:r>
-              <a:rPr lang="en-GB" sz="6000" dirty="0" smtClean="0">
+              <a:rPr lang="en-GB" sz="6000" dirty="0">
                 <a:latin typeface="Arial" panose="020B0604020202020204" pitchFamily="34" charset="0"/>
                 <a:cs typeface="Arial" panose="020B0604020202020204" pitchFamily="34" charset="0"/>
               </a:rPr>
               <a:t>Flood Plains</a:t>
             </a:r>
-            <a:endParaRPr lang="en-GB" sz="6000" dirty="0">
-              <a:latin typeface="Arial" panose="020B0604020202020204" pitchFamily="34" charset="0"/>
-              <a:cs typeface="Arial" panose="020B0604020202020204" pitchFamily="34" charset="0"/>
-            </a:endParaRPr>
           </a:p>
         </p:txBody>
       </p:sp>
@@ -7319,10 +7165,9 @@
           <a:lstStyle/>
           <a:p>
             <a:r>
-              <a:rPr lang="en-GB" dirty="0" smtClean="0"/>
+              <a:rPr lang="en-GB" dirty="0"/>
               <a:t>The ground around the river is boggy and sodden. After heavy rain, the river swells and floods this area, covering it in water. Making growing crops or building structures almost impossible, as it spends large parts of the year entirely underwater. Some of the rocks near the shore are dry, but the ground around them is wet from recent flooding. </a:t>
             </a:r>
-            <a:endParaRPr lang="en-GB" dirty="0"/>
           </a:p>
         </p:txBody>
       </p:sp>
@@ -7398,16 +7243,12 @@
           </a:lstStyle>
           <a:p>
             <a:r>
-              <a:rPr lang="en-GB" sz="6000" dirty="0" smtClean="0">
+              <a:rPr lang="en-GB" sz="6000" dirty="0">
                 <a:latin typeface="Arial" panose="020B0604020202020204" pitchFamily="34" charset="0"/>
                 <a:cs typeface="Arial" panose="020B0604020202020204" pitchFamily="34" charset="0"/>
               </a:rPr>
               <a:t>Flood Plains</a:t>
             </a:r>
-            <a:endParaRPr lang="en-GB" sz="6000" dirty="0">
-              <a:latin typeface="Arial" panose="020B0604020202020204" pitchFamily="34" charset="0"/>
-              <a:cs typeface="Arial" panose="020B0604020202020204" pitchFamily="34" charset="0"/>
-            </a:endParaRPr>
           </a:p>
         </p:txBody>
       </p:sp>
@@ -7435,21 +7276,8 @@
           <a:p>
             <a:r>
               <a:rPr lang="en-GB" dirty="0"/>
-              <a:t>The ground around the river is boggy and sodden. After heavy rain, the river swells and floods this area, covering it in water. Making growing crops or building structures almost </a:t>
-            </a:r>
-            <a:r>
-              <a:rPr lang="en-GB" dirty="0" smtClean="0"/>
-              <a:t>impossible, </a:t>
-            </a:r>
-            <a:r>
-              <a:rPr lang="en-GB" dirty="0"/>
-              <a:t>as it spends large parts of the year entirely underwater. </a:t>
-            </a:r>
-            <a:r>
-              <a:rPr lang="en-GB" dirty="0" smtClean="0"/>
-              <a:t>Part way along the river bank, some large webbed foot prints can be seen leading away from the river before vanishing without trace. </a:t>
-            </a:r>
-            <a:endParaRPr lang="en-GB" dirty="0"/>
+              <a:t>The ground around the river is boggy and sodden. After heavy rain, the river swells and floods this area, covering it in water. Making growing crops or building structures almost impossible, as it spends large parts of the year entirely underwater. Part way along the river bank, some large webbed foot prints can be seen leading away from the river before vanishing without trace. </a:t>
+            </a:r>
           </a:p>
         </p:txBody>
       </p:sp>
@@ -7525,16 +7353,12 @@
           </a:lstStyle>
           <a:p>
             <a:r>
-              <a:rPr lang="en-GB" sz="6000" dirty="0" smtClean="0">
+              <a:rPr lang="en-GB" sz="6000" dirty="0">
                 <a:latin typeface="Arial" panose="020B0604020202020204" pitchFamily="34" charset="0"/>
                 <a:cs typeface="Arial" panose="020B0604020202020204" pitchFamily="34" charset="0"/>
               </a:rPr>
               <a:t>Fishing Shack</a:t>
             </a:r>
-            <a:endParaRPr lang="en-GB" sz="6000" dirty="0">
-              <a:latin typeface="Arial" panose="020B0604020202020204" pitchFamily="34" charset="0"/>
-              <a:cs typeface="Arial" panose="020B0604020202020204" pitchFamily="34" charset="0"/>
-            </a:endParaRPr>
           </a:p>
         </p:txBody>
       </p:sp>
@@ -7560,26 +7384,9 @@
           <a:lstStyle/>
           <a:p>
             <a:r>
-              <a:rPr lang="en-GB" dirty="0" smtClean="0"/>
-              <a:t>Fishermen congregate in this exposed shack, resting on precarious </a:t>
-            </a:r>
-            <a:r>
-              <a:rPr lang="en-GB" dirty="0" smtClean="0"/>
-              <a:t>stilts </a:t>
-            </a:r>
-            <a:r>
-              <a:rPr lang="en-GB" dirty="0" smtClean="0"/>
-              <a:t>above the </a:t>
-            </a:r>
-            <a:r>
-              <a:rPr lang="en-GB" dirty="0" smtClean="0"/>
-              <a:t>river, </a:t>
-            </a:r>
-            <a:r>
-              <a:rPr lang="en-GB" dirty="0" smtClean="0"/>
-              <a:t>hoping to catch the giant leaping sturgeon that reside in this part of the river. The inside of the shack is bare, consisting only of a few small bunks an a small stove nested away in the corner. Outside the shack is a large balcony with a wooden railing. Fishing poles are lined up along it, their lures dangling down into the river. </a:t>
-            </a:r>
-            <a:endParaRPr lang="en-GB" dirty="0"/>
+              <a:rPr lang="en-GB" dirty="0"/>
+              <a:t>Fishermen congregate in this exposed shack, resting on precarious stilts above the river, hoping to catch the giant leaping sturgeon that reside in this part of the river. The inside of the shack is bare, consisting only of a few small bunks an a small stove nested away in the corner. Outside the shack is a large balcony with a wooden railing. Fishing poles are lined up along it, their lures dangling down into the river. </a:t>
+            </a:r>
           </a:p>
         </p:txBody>
       </p:sp>
@@ -7655,16 +7462,12 @@
           </a:lstStyle>
           <a:p>
             <a:r>
-              <a:rPr lang="en-GB" sz="6000" dirty="0" smtClean="0">
+              <a:rPr lang="en-GB" sz="6000" dirty="0">
                 <a:latin typeface="Arial" panose="020B0604020202020204" pitchFamily="34" charset="0"/>
                 <a:cs typeface="Arial" panose="020B0604020202020204" pitchFamily="34" charset="0"/>
               </a:rPr>
               <a:t>Forest 2</a:t>
             </a:r>
-            <a:endParaRPr lang="en-GB" sz="6000" dirty="0">
-              <a:latin typeface="Arial" panose="020B0604020202020204" pitchFamily="34" charset="0"/>
-              <a:cs typeface="Arial" panose="020B0604020202020204" pitchFamily="34" charset="0"/>
-            </a:endParaRPr>
           </a:p>
         </p:txBody>
       </p:sp>
@@ -7691,10 +7494,9 @@
           <a:lstStyle/>
           <a:p>
             <a:r>
-              <a:rPr lang="en-GB" dirty="0" smtClean="0"/>
+              <a:rPr lang="en-GB" dirty="0"/>
               <a:t>The forest is dense, the trees are high and their roots run deep. The air is close and the leaves of the trees block out most of the light casting a dark shadow over everything in sight. The rustle of leaves and snapping of twigs in all around makes it feel as if something sinister is watching.</a:t>
             </a:r>
-            <a:endParaRPr lang="en-GB" dirty="0"/>
           </a:p>
         </p:txBody>
       </p:sp>
@@ -7770,16 +7572,12 @@
           </a:lstStyle>
           <a:p>
             <a:r>
-              <a:rPr lang="en-GB" sz="6000" dirty="0" smtClean="0">
+              <a:rPr lang="en-GB" sz="6000" dirty="0">
                 <a:latin typeface="Arial" panose="020B0604020202020204" pitchFamily="34" charset="0"/>
                 <a:cs typeface="Arial" panose="020B0604020202020204" pitchFamily="34" charset="0"/>
               </a:rPr>
               <a:t>River 1</a:t>
             </a:r>
-            <a:endParaRPr lang="en-GB" sz="6000" dirty="0">
-              <a:latin typeface="Arial" panose="020B0604020202020204" pitchFamily="34" charset="0"/>
-              <a:cs typeface="Arial" panose="020B0604020202020204" pitchFamily="34" charset="0"/>
-            </a:endParaRPr>
           </a:p>
         </p:txBody>
       </p:sp>
@@ -7805,18 +7603,9 @@
           <a:lstStyle/>
           <a:p>
             <a:r>
-              <a:rPr lang="en-GB" dirty="0" smtClean="0"/>
-              <a:t>The river is a raging torrent of water gushing down from the mountains as a result of the summer thaw. It crashes down the </a:t>
-            </a:r>
-            <a:r>
-              <a:rPr lang="en-GB" dirty="0" smtClean="0"/>
-              <a:t>valley </a:t>
-            </a:r>
-            <a:r>
-              <a:rPr lang="en-GB" dirty="0" smtClean="0"/>
-              <a:t>with a force so powerful any attempt to cross would result in being swept away. Sometimes when the light hits the water in just the right way, the crashing waves can be seen to take the appearance of galloping horses. </a:t>
-            </a:r>
-            <a:endParaRPr lang="en-GB" dirty="0"/>
+              <a:rPr lang="en-GB" dirty="0"/>
+              <a:t>The river is a raging torrent of water gushing down from the mountains as a result of the summer thaw. It crashes down the valley with a force so powerful any attempt to cross would result in being swept away. Sometimes when the light hits the water in just the right way, the crashing waves can be seen to take the appearance of galloping horses. </a:t>
+            </a:r>
           </a:p>
         </p:txBody>
       </p:sp>
@@ -7892,16 +7681,12 @@
           </a:lstStyle>
           <a:p>
             <a:r>
-              <a:rPr lang="en-GB" sz="6000" dirty="0" smtClean="0">
+              <a:rPr lang="en-GB" sz="6000" dirty="0">
                 <a:latin typeface="Arial" panose="020B0604020202020204" pitchFamily="34" charset="0"/>
                 <a:cs typeface="Arial" panose="020B0604020202020204" pitchFamily="34" charset="0"/>
               </a:rPr>
               <a:t>Murky Mire</a:t>
             </a:r>
-            <a:endParaRPr lang="en-GB" sz="6000" dirty="0">
-              <a:latin typeface="Arial" panose="020B0604020202020204" pitchFamily="34" charset="0"/>
-              <a:cs typeface="Arial" panose="020B0604020202020204" pitchFamily="34" charset="0"/>
-            </a:endParaRPr>
           </a:p>
         </p:txBody>
       </p:sp>
@@ -7927,24 +7712,8 @@
           <a:lstStyle/>
           <a:p>
             <a:r>
-              <a:rPr lang="en-GB" dirty="0" smtClean="0"/>
-              <a:t>The air above the mire is stagnant and foul. The ground is covered in a thick, oozing, mud which releases a foul gas with every step. Deep in the pools of murky water littering the mire, the eyes of the poor souls who had the misfortune to die in this dank place can </a:t>
-            </a:r>
-            <a:r>
-              <a:rPr lang="en-GB" dirty="0" smtClean="0"/>
-              <a:t>sometimes be seen, </a:t>
-            </a:r>
-            <a:r>
-              <a:rPr lang="en-GB" dirty="0" smtClean="0"/>
-              <a:t>staring up from the </a:t>
-            </a:r>
-            <a:r>
-              <a:rPr lang="en-GB" dirty="0" smtClean="0"/>
-              <a:t>depths, </a:t>
-            </a:r>
-            <a:r>
-              <a:rPr lang="en-GB" dirty="0" smtClean="0"/>
-              <a:t>before disappearing into the mirk. </a:t>
+              <a:rPr lang="en-GB" dirty="0"/>
+              <a:t>The air above the mire is stagnant and foul. The ground is covered in a thick, oozing, mud which releases a foul gas with every step. Deep in the pools of murky water littering the mire, the eyes of the poor souls who had the misfortune to die in this dank place can sometimes be seen, staring up from the depths, before disappearing into the mirk. </a:t>
             </a:r>
           </a:p>
         </p:txBody>
@@ -8021,16 +7790,12 @@
           </a:lstStyle>
           <a:p>
             <a:r>
-              <a:rPr lang="en-GB" sz="6000" dirty="0" smtClean="0">
+              <a:rPr lang="en-GB" sz="6000" dirty="0">
                 <a:latin typeface="Arial" panose="020B0604020202020204" pitchFamily="34" charset="0"/>
                 <a:cs typeface="Arial" panose="020B0604020202020204" pitchFamily="34" charset="0"/>
               </a:rPr>
               <a:t>Grotto</a:t>
             </a:r>
-            <a:endParaRPr lang="en-GB" sz="6000" dirty="0">
-              <a:latin typeface="Arial" panose="020B0604020202020204" pitchFamily="34" charset="0"/>
-              <a:cs typeface="Arial" panose="020B0604020202020204" pitchFamily="34" charset="0"/>
-            </a:endParaRPr>
           </a:p>
         </p:txBody>
       </p:sp>
@@ -8056,26 +7821,9 @@
           <a:lstStyle/>
           <a:p>
             <a:r>
-              <a:rPr lang="en-GB" dirty="0" smtClean="0"/>
-              <a:t>A mysterious </a:t>
-            </a:r>
-            <a:r>
-              <a:rPr lang="en-GB" dirty="0" smtClean="0"/>
-              <a:t>grotto, </a:t>
-            </a:r>
-            <a:r>
-              <a:rPr lang="en-GB" dirty="0" smtClean="0"/>
-              <a:t>at it’s </a:t>
-            </a:r>
-            <a:r>
-              <a:rPr lang="en-GB" dirty="0" smtClean="0"/>
-              <a:t>centre </a:t>
-            </a:r>
-            <a:r>
-              <a:rPr lang="en-GB" dirty="0" smtClean="0"/>
-              <a:t>is a huge ancient willow tree. It branches span all around and droop so low they form a giant curtain of green. Within its veil, an aura of life can be felt everywhere fighting back against the dark and lifeless swamp. At the base of the trees trunk is a glimmering green light, radiating off the bark as if the very essence of its life was radiating out from it. </a:t>
-            </a:r>
-            <a:endParaRPr lang="en-GB" dirty="0"/>
+              <a:rPr lang="en-GB" dirty="0"/>
+              <a:t>A mysterious grotto, at it’s centre is a huge ancient willow tree. It branches span all around and droop so low they form a giant curtain of green. Within its veil, an aura of life can be felt everywhere fighting back against the dark and lifeless swamp. At the base of the trees trunk is a glimmering green light, radiating off the bark as if the very essence of its life was radiating out from it. </a:t>
+            </a:r>
           </a:p>
         </p:txBody>
       </p:sp>
@@ -8151,16 +7899,12 @@
           </a:lstStyle>
           <a:p>
             <a:r>
-              <a:rPr lang="en-GB" sz="6000" dirty="0" smtClean="0">
+              <a:rPr lang="en-GB" sz="6000" dirty="0">
                 <a:latin typeface="Arial" panose="020B0604020202020204" pitchFamily="34" charset="0"/>
                 <a:cs typeface="Arial" panose="020B0604020202020204" pitchFamily="34" charset="0"/>
               </a:rPr>
               <a:t>Marsh 3</a:t>
             </a:r>
-            <a:endParaRPr lang="en-GB" sz="6000" dirty="0">
-              <a:latin typeface="Arial" panose="020B0604020202020204" pitchFamily="34" charset="0"/>
-              <a:cs typeface="Arial" panose="020B0604020202020204" pitchFamily="34" charset="0"/>
-            </a:endParaRPr>
           </a:p>
         </p:txBody>
       </p:sp>
@@ -8186,16 +7930,8 @@
           <a:lstStyle/>
           <a:p>
             <a:r>
-              <a:rPr lang="en-GB" dirty="0" smtClean="0"/>
-              <a:t>The ground underfoot is boggy and wet. There are small channels of water trickling between grassy mounds of earth and clumps reeds protruding </a:t>
-            </a:r>
-            <a:r>
-              <a:rPr lang="en-GB" dirty="0" smtClean="0"/>
-              <a:t>from </a:t>
-            </a:r>
-            <a:r>
-              <a:rPr lang="en-GB" dirty="0" smtClean="0"/>
-              <a:t>shallow pools of stagnant water. Every now and then a small frog will emerge from one of the pools, hop over one of the grassy mounds and dive back in disappearing from view.</a:t>
+              <a:rPr lang="en-GB" dirty="0"/>
+              <a:t>The ground underfoot is boggy and wet. There are small channels of water trickling between grassy mounds of earth and clumps reeds protruding from shallow pools of stagnant water. Every now and then a small frog will emerge from one of the pools, hop over one of the grassy mounds and dive back in disappearing from view.</a:t>
             </a:r>
           </a:p>
         </p:txBody>
@@ -8272,16 +8008,12 @@
           </a:lstStyle>
           <a:p>
             <a:r>
-              <a:rPr lang="en-GB" sz="6000" dirty="0" smtClean="0">
+              <a:rPr lang="en-GB" sz="6000" dirty="0">
                 <a:latin typeface="Arial" panose="020B0604020202020204" pitchFamily="34" charset="0"/>
                 <a:cs typeface="Arial" panose="020B0604020202020204" pitchFamily="34" charset="0"/>
               </a:rPr>
               <a:t>Gentle Stream 2</a:t>
             </a:r>
-            <a:endParaRPr lang="en-GB" sz="6000" dirty="0">
-              <a:latin typeface="Arial" panose="020B0604020202020204" pitchFamily="34" charset="0"/>
-              <a:cs typeface="Arial" panose="020B0604020202020204" pitchFamily="34" charset="0"/>
-            </a:endParaRPr>
           </a:p>
         </p:txBody>
       </p:sp>
@@ -8332,12 +8064,8 @@
           <a:lstStyle/>
           <a:p>
             <a:r>
-              <a:rPr lang="en-GB" dirty="0" smtClean="0"/>
-              <a:t>The ebb and flow of the water in this gentle stream combined with the soft glow of the sun create a truly tranquil atmosphere. Along the riverbanks, the grass is green and lush, small fish can be seen swimming about in the shallows near the shore. </a:t>
-            </a:r>
-            <a:r>
-              <a:rPr lang="en-GB" dirty="0" smtClean="0"/>
-              <a:t>The water in the stream is so clear that it creates almost a perfect reflection of the stunning blue sky.</a:t>
+              <a:rPr lang="en-GB" dirty="0"/>
+              <a:t>The ebb and flow of the water in this gentle stream combined with the soft glow of the sun create a truly tranquil atmosphere. Along the riverbanks, the grass is green and lush, small fish can be seen swimming about in the shallows near the shore. The water in the stream is so clear that it creates almost a perfect reflection of the stunning blue sky.</a:t>
             </a:r>
           </a:p>
         </p:txBody>
@@ -8414,16 +8142,12 @@
           </a:lstStyle>
           <a:p>
             <a:r>
-              <a:rPr lang="en-GB" sz="6000" dirty="0" smtClean="0">
+              <a:rPr lang="en-GB" sz="6000" dirty="0">
                 <a:latin typeface="Arial" panose="020B0604020202020204" pitchFamily="34" charset="0"/>
                 <a:cs typeface="Arial" panose="020B0604020202020204" pitchFamily="34" charset="0"/>
               </a:rPr>
               <a:t>Gentle Steam 1</a:t>
             </a:r>
-            <a:endParaRPr lang="en-GB" sz="6000" dirty="0">
-              <a:latin typeface="Arial" panose="020B0604020202020204" pitchFamily="34" charset="0"/>
-              <a:cs typeface="Arial" panose="020B0604020202020204" pitchFamily="34" charset="0"/>
-            </a:endParaRPr>
           </a:p>
         </p:txBody>
       </p:sp>
@@ -8449,18 +8173,9 @@
           <a:lstStyle/>
           <a:p>
             <a:r>
-              <a:rPr lang="en-GB" dirty="0" smtClean="0"/>
-              <a:t>The ebb and flow of the water in this gentle stream combined with the soft glow of the sun create a truly tranquil atmosphere. Along the riverbanks, the grass is green and lush, small fish can be seen swimming about in the shallows near the shore</a:t>
-            </a:r>
-            <a:r>
-              <a:rPr lang="en-GB" dirty="0" smtClean="0"/>
-              <a:t>. </a:t>
-            </a:r>
-            <a:r>
-              <a:rPr lang="en-GB" dirty="0" smtClean="0"/>
-              <a:t>The stream is only a few inches deep in places with small, perfectly round, stones lying in amongst the reeds on the steam bed. </a:t>
-            </a:r>
-            <a:endParaRPr lang="en-GB" dirty="0" smtClean="0"/>
+              <a:rPr lang="en-GB" dirty="0"/>
+              <a:t>The ebb and flow of the water in this gentle stream combined with the soft glow of the sun create a truly tranquil atmosphere. Along the riverbanks, the grass is green and lush, small fish can be seen swimming about in the shallows near the shore. The stream is only a few inches deep in places with small, perfectly round, stones lying in amongst the reeds on the steam bed. </a:t>
+            </a:r>
           </a:p>
         </p:txBody>
       </p:sp>
@@ -8536,16 +8251,12 @@
           </a:lstStyle>
           <a:p>
             <a:r>
-              <a:rPr lang="en-GB" sz="6000" dirty="0" smtClean="0">
+              <a:rPr lang="en-GB" sz="6000" dirty="0">
                 <a:latin typeface="Arial" panose="020B0604020202020204" pitchFamily="34" charset="0"/>
                 <a:cs typeface="Arial" panose="020B0604020202020204" pitchFamily="34" charset="0"/>
               </a:rPr>
               <a:t>Bridge</a:t>
             </a:r>
-            <a:endParaRPr lang="en-GB" sz="6000" dirty="0">
-              <a:latin typeface="Arial" panose="020B0604020202020204" pitchFamily="34" charset="0"/>
-              <a:cs typeface="Arial" panose="020B0604020202020204" pitchFamily="34" charset="0"/>
-            </a:endParaRPr>
           </a:p>
         </p:txBody>
       </p:sp>
@@ -8571,14 +8282,9 @@
           <a:lstStyle/>
           <a:p>
             <a:r>
-              <a:rPr lang="en-GB" dirty="0" smtClean="0"/>
-              <a:t>This larg</a:t>
-            </a:r>
-            <a:r>
-              <a:rPr lang="en-GB" dirty="0" smtClean="0"/>
-              <a:t>e and sturdy oaken bridge has stood the test of time. Although discoloured by algae and mould, it’s structure remains strong. It Towers over the rushing river, providing safe passage over the torrential current bellow. It is a wonder, how after all this time, it still stands tall against the power of the water surging underneath it.  </a:t>
-            </a:r>
-            <a:endParaRPr lang="en-GB" dirty="0" smtClean="0"/>
+              <a:rPr lang="en-GB" dirty="0"/>
+              <a:t>This large and sturdy oaken bridge has stood the test of time. Although discoloured by algae and mould, it’s structure remains strong. It Towers over the rushing river, providing safe passage over the torrential current bellow. It is a wonder, how after all this time, it still stands tall against the power of the water surging underneath it.  </a:t>
+            </a:r>
           </a:p>
         </p:txBody>
       </p:sp>
@@ -8654,16 +8360,12 @@
           </a:lstStyle>
           <a:p>
             <a:r>
-              <a:rPr lang="en-GB" sz="6000" dirty="0" smtClean="0">
+              <a:rPr lang="en-GB" sz="6000" dirty="0">
                 <a:latin typeface="Arial" panose="020B0604020202020204" pitchFamily="34" charset="0"/>
                 <a:cs typeface="Arial" panose="020B0604020202020204" pitchFamily="34" charset="0"/>
               </a:rPr>
               <a:t>River 5</a:t>
             </a:r>
-            <a:endParaRPr lang="en-GB" sz="6000" dirty="0">
-              <a:latin typeface="Arial" panose="020B0604020202020204" pitchFamily="34" charset="0"/>
-              <a:cs typeface="Arial" panose="020B0604020202020204" pitchFamily="34" charset="0"/>
-            </a:endParaRPr>
           </a:p>
         </p:txBody>
       </p:sp>
@@ -8689,26 +8391,9 @@
           <a:lstStyle/>
           <a:p>
             <a:r>
-              <a:rPr lang="en-GB" dirty="0" smtClean="0"/>
-              <a:t>The river is a raging torrent of water gushing down from the mountains as a result of the summer thaw. It crashes down </a:t>
-            </a:r>
-            <a:r>
-              <a:rPr lang="en-GB" dirty="0" smtClean="0"/>
-              <a:t>the </a:t>
-            </a:r>
-            <a:r>
-              <a:rPr lang="en-GB" dirty="0" smtClean="0"/>
-              <a:t>valley with a force so powerful any attempt to cross would result in being swept away</a:t>
-            </a:r>
-            <a:r>
-              <a:rPr lang="en-GB" dirty="0" smtClean="0"/>
-              <a:t>. Th</a:t>
-            </a:r>
-            <a:r>
-              <a:rPr lang="en-GB" dirty="0" smtClean="0"/>
-              <a:t>e sound of the water crashing through the valley is almost deafening, nothing else can be heard of the thundering of the water. </a:t>
-            </a:r>
-            <a:endParaRPr lang="en-GB" dirty="0" smtClean="0"/>
+              <a:rPr lang="en-GB" dirty="0"/>
+              <a:t>The river is a raging torrent of water gushing down from the mountains as a result of the summer thaw. It crashes down the valley with a force so powerful any attempt to cross would result in being swept away. The sound of the water crashing through the valley is almost deafening, nothing else can be heard of the thundering of the water. </a:t>
+            </a:r>
           </a:p>
         </p:txBody>
       </p:sp>
@@ -8784,16 +8469,12 @@
           </a:lstStyle>
           <a:p>
             <a:r>
-              <a:rPr lang="en-GB" sz="6000" dirty="0" smtClean="0">
+              <a:rPr lang="en-GB" sz="6000" dirty="0">
                 <a:latin typeface="Arial" panose="020B0604020202020204" pitchFamily="34" charset="0"/>
                 <a:cs typeface="Arial" panose="020B0604020202020204" pitchFamily="34" charset="0"/>
               </a:rPr>
               <a:t>River 4</a:t>
             </a:r>
-            <a:endParaRPr lang="en-GB" sz="6000" dirty="0">
-              <a:latin typeface="Arial" panose="020B0604020202020204" pitchFamily="34" charset="0"/>
-              <a:cs typeface="Arial" panose="020B0604020202020204" pitchFamily="34" charset="0"/>
-            </a:endParaRPr>
           </a:p>
         </p:txBody>
       </p:sp>
@@ -8819,26 +8500,9 @@
           <a:lstStyle/>
           <a:p>
             <a:r>
-              <a:rPr lang="en-GB" dirty="0" smtClean="0"/>
-              <a:t>The river is a raging torrent of water gushing down from the mountains as a result of the summer thaw. It crashes down </a:t>
-            </a:r>
-            <a:r>
-              <a:rPr lang="en-GB" dirty="0" smtClean="0"/>
-              <a:t>the </a:t>
-            </a:r>
-            <a:r>
-              <a:rPr lang="en-GB" dirty="0" smtClean="0"/>
-              <a:t>valley with a force so powerful any attempt to cross would result in being swept away</a:t>
-            </a:r>
-            <a:r>
-              <a:rPr lang="en-GB" dirty="0" smtClean="0"/>
-              <a:t>. </a:t>
-            </a:r>
-            <a:r>
-              <a:rPr lang="en-GB" dirty="0" smtClean="0"/>
-              <a:t>At times when the waves momentarily subside, the calm blue of the water can be seen beneath the chaos of the crashing waves.</a:t>
-            </a:r>
-            <a:endParaRPr lang="en-GB" dirty="0"/>
+              <a:rPr lang="en-GB" dirty="0"/>
+              <a:t>The river is a raging torrent of water gushing down from the mountains as a result of the summer thaw. It crashes down the valley with a force so powerful any attempt to cross would result in being swept away. At times when the waves momentarily subside, the calm blue of the water can be seen beneath the chaos of the crashing waves.</a:t>
+            </a:r>
           </a:p>
         </p:txBody>
       </p:sp>
@@ -8914,16 +8578,12 @@
           </a:lstStyle>
           <a:p>
             <a:r>
-              <a:rPr lang="en-GB" sz="6000" dirty="0" smtClean="0">
+              <a:rPr lang="en-GB" sz="6000" dirty="0">
                 <a:latin typeface="Arial" panose="020B0604020202020204" pitchFamily="34" charset="0"/>
                 <a:cs typeface="Arial" panose="020B0604020202020204" pitchFamily="34" charset="0"/>
               </a:rPr>
               <a:t>River 3</a:t>
             </a:r>
-            <a:endParaRPr lang="en-GB" sz="6000" dirty="0">
-              <a:latin typeface="Arial" panose="020B0604020202020204" pitchFamily="34" charset="0"/>
-              <a:cs typeface="Arial" panose="020B0604020202020204" pitchFamily="34" charset="0"/>
-            </a:endParaRPr>
           </a:p>
         </p:txBody>
       </p:sp>
@@ -8949,22 +8609,9 @@
           <a:lstStyle/>
           <a:p>
             <a:r>
-              <a:rPr lang="en-GB" dirty="0" smtClean="0"/>
-              <a:t>The river is a raging torrent of water gushing down from the mountains as a result of the summer thaw. It crashes down </a:t>
-            </a:r>
-            <a:r>
-              <a:rPr lang="en-GB" dirty="0" smtClean="0"/>
-              <a:t>the </a:t>
-            </a:r>
-            <a:r>
-              <a:rPr lang="en-GB" dirty="0" smtClean="0"/>
-              <a:t>valley with a force so powerful any attempt to cross would result in being swept away. </a:t>
-            </a:r>
-            <a:r>
-              <a:rPr lang="en-GB" dirty="0" smtClean="0"/>
-              <a:t>The ferocity of the water is similar to that of a great bear, charging down the valley.</a:t>
-            </a:r>
-            <a:endParaRPr lang="en-GB" dirty="0"/>
+              <a:rPr lang="en-GB" dirty="0"/>
+              <a:t>The river is a raging torrent of water gushing down from the mountains as a result of the summer thaw. It crashes down the valley with a force so powerful any attempt to cross would result in being swept away. The ferocity of the water is similar to that of a great bear, charging down the valley.</a:t>
+            </a:r>
           </a:p>
         </p:txBody>
       </p:sp>
@@ -9040,16 +8687,12 @@
           </a:lstStyle>
           <a:p>
             <a:r>
-              <a:rPr lang="en-GB" sz="6000" dirty="0" smtClean="0">
+              <a:rPr lang="en-GB" sz="6000" dirty="0">
                 <a:latin typeface="Arial" panose="020B0604020202020204" pitchFamily="34" charset="0"/>
                 <a:cs typeface="Arial" panose="020B0604020202020204" pitchFamily="34" charset="0"/>
               </a:rPr>
               <a:t>Forest 3</a:t>
             </a:r>
-            <a:endParaRPr lang="en-GB" sz="6000" dirty="0">
-              <a:latin typeface="Arial" panose="020B0604020202020204" pitchFamily="34" charset="0"/>
-              <a:cs typeface="Arial" panose="020B0604020202020204" pitchFamily="34" charset="0"/>
-            </a:endParaRPr>
           </a:p>
         </p:txBody>
       </p:sp>
@@ -9076,10 +8719,9 @@
           <a:lstStyle/>
           <a:p>
             <a:r>
-              <a:rPr lang="en-GB" dirty="0" smtClean="0"/>
+              <a:rPr lang="en-GB" dirty="0"/>
               <a:t>The forest is dense, the trees are high and their roots run deep. The air is close and the leaves of the trees block out most of the light casting a dark shadow over everything in sight. Thick spider webs hang from the trees and creatures scuttle about in the shadows.</a:t>
             </a:r>
-            <a:endParaRPr lang="en-GB" dirty="0"/>
           </a:p>
         </p:txBody>
       </p:sp>
@@ -9155,16 +8797,12 @@
           </a:lstStyle>
           <a:p>
             <a:r>
-              <a:rPr lang="en-GB" sz="6000" dirty="0" smtClean="0">
+              <a:rPr lang="en-GB" sz="6000" dirty="0">
                 <a:latin typeface="Arial" panose="020B0604020202020204" pitchFamily="34" charset="0"/>
                 <a:cs typeface="Arial" panose="020B0604020202020204" pitchFamily="34" charset="0"/>
               </a:rPr>
               <a:t>River 2</a:t>
             </a:r>
-            <a:endParaRPr lang="en-GB" sz="6000" dirty="0">
-              <a:latin typeface="Arial" panose="020B0604020202020204" pitchFamily="34" charset="0"/>
-              <a:cs typeface="Arial" panose="020B0604020202020204" pitchFamily="34" charset="0"/>
-            </a:endParaRPr>
           </a:p>
         </p:txBody>
       </p:sp>
@@ -9190,22 +8828,9 @@
           <a:lstStyle/>
           <a:p>
             <a:r>
-              <a:rPr lang="en-GB" dirty="0" smtClean="0"/>
-              <a:t>The river is a raging torrent of water gushing down from the mountains as a result of the summer thaw. It crashes down </a:t>
-            </a:r>
-            <a:r>
-              <a:rPr lang="en-GB" dirty="0" smtClean="0"/>
-              <a:t>the </a:t>
-            </a:r>
-            <a:r>
-              <a:rPr lang="en-GB" dirty="0" smtClean="0"/>
-              <a:t>valley with a force so powerful any attempt to cross would result in being swept away. </a:t>
-            </a:r>
-            <a:r>
-              <a:rPr lang="en-GB" dirty="0" smtClean="0"/>
-              <a:t>The valley turns at an almost impossible angle, with the river still raging through. The bend is not of natural creation, it looks like long ago this valley was stopped in its tracks by a being of immense power. </a:t>
-            </a:r>
-            <a:endParaRPr lang="en-GB" dirty="0"/>
+              <a:rPr lang="en-GB" dirty="0"/>
+              <a:t>The river is a raging torrent of water gushing down from the mountains as a result of the summer thaw. It crashes down the valley with a force so powerful any attempt to cross would result in being swept away. The valley turns at an almost impossible angle, with the river still raging through. The bend is not of natural creation, it looks like long ago this valley was stopped in its tracks by a being of immense power. </a:t>
+            </a:r>
           </a:p>
         </p:txBody>
       </p:sp>
@@ -9281,16 +8906,12 @@
           </a:lstStyle>
           <a:p>
             <a:r>
-              <a:rPr lang="en-GB" sz="6000" dirty="0" smtClean="0">
+              <a:rPr lang="en-GB" sz="6000" dirty="0">
                 <a:latin typeface="Arial" panose="020B0604020202020204" pitchFamily="34" charset="0"/>
                 <a:cs typeface="Arial" panose="020B0604020202020204" pitchFamily="34" charset="0"/>
               </a:rPr>
               <a:t>Swamp 2</a:t>
             </a:r>
-            <a:endParaRPr lang="en-GB" sz="6000" dirty="0">
-              <a:latin typeface="Arial" panose="020B0604020202020204" pitchFamily="34" charset="0"/>
-              <a:cs typeface="Arial" panose="020B0604020202020204" pitchFamily="34" charset="0"/>
-            </a:endParaRPr>
           </a:p>
         </p:txBody>
       </p:sp>
@@ -9316,10 +8937,9 @@
           <a:lstStyle/>
           <a:p>
             <a:r>
-              <a:rPr lang="en-GB" dirty="0" smtClean="0"/>
+              <a:rPr lang="en-GB" dirty="0"/>
               <a:t>The trees growing out of the swamp seem lifeless and limp. All life looks like it has been drained out of them by the foul air, corrupted by the slow decay of everything around. No new signs of life have been seen in this swamp for a very long time. </a:t>
             </a:r>
-            <a:endParaRPr lang="en-GB" dirty="0"/>
           </a:p>
         </p:txBody>
       </p:sp>
@@ -9395,16 +9015,12 @@
           </a:lstStyle>
           <a:p>
             <a:r>
-              <a:rPr lang="en-GB" sz="6000" dirty="0" smtClean="0">
+              <a:rPr lang="en-GB" sz="6000" dirty="0">
                 <a:latin typeface="Arial" panose="020B0604020202020204" pitchFamily="34" charset="0"/>
                 <a:cs typeface="Arial" panose="020B0604020202020204" pitchFamily="34" charset="0"/>
               </a:rPr>
               <a:t>Pond</a:t>
             </a:r>
-            <a:endParaRPr lang="en-GB" sz="6000" dirty="0">
-              <a:latin typeface="Arial" panose="020B0604020202020204" pitchFamily="34" charset="0"/>
-              <a:cs typeface="Arial" panose="020B0604020202020204" pitchFamily="34" charset="0"/>
-            </a:endParaRPr>
           </a:p>
         </p:txBody>
       </p:sp>
@@ -9430,10 +9046,9 @@
           <a:lstStyle/>
           <a:p>
             <a:r>
-              <a:rPr lang="en-GB" dirty="0" smtClean="0"/>
+              <a:rPr lang="en-GB" dirty="0"/>
               <a:t>A quiet and murky pond, lost in the waste land of the swamps and marshes. There are few signs of life here, other than a few miserable looking ducks, swimming about in the dank brown water.</a:t>
             </a:r>
-            <a:endParaRPr lang="en-GB" dirty="0"/>
           </a:p>
         </p:txBody>
       </p:sp>
@@ -9509,16 +9124,12 @@
           </a:lstStyle>
           <a:p>
             <a:r>
-              <a:rPr lang="en-GB" sz="6000" dirty="0" smtClean="0">
+              <a:rPr lang="en-GB" sz="6000" dirty="0">
                 <a:latin typeface="Arial" panose="020B0604020202020204" pitchFamily="34" charset="0"/>
                 <a:cs typeface="Arial" panose="020B0604020202020204" pitchFamily="34" charset="0"/>
               </a:rPr>
               <a:t>Marsh 2</a:t>
             </a:r>
-            <a:endParaRPr lang="en-GB" sz="6000" dirty="0">
-              <a:latin typeface="Arial" panose="020B0604020202020204" pitchFamily="34" charset="0"/>
-              <a:cs typeface="Arial" panose="020B0604020202020204" pitchFamily="34" charset="0"/>
-            </a:endParaRPr>
           </a:p>
         </p:txBody>
       </p:sp>
@@ -9544,22 +9155,9 @@
           <a:lstStyle/>
           <a:p>
             <a:r>
-              <a:rPr lang="en-GB" dirty="0" smtClean="0"/>
-              <a:t>The ground underfoot is boggy and wet. There are small channels of water trickling between grassy mounds of earth and clumps reeds protruding </a:t>
-            </a:r>
-            <a:r>
-              <a:rPr lang="en-GB" dirty="0" smtClean="0"/>
-              <a:t>from </a:t>
-            </a:r>
-            <a:r>
-              <a:rPr lang="en-GB" dirty="0" smtClean="0"/>
-              <a:t>shallow pools of stagnant water. </a:t>
-            </a:r>
-            <a:r>
-              <a:rPr lang="en-GB" dirty="0" smtClean="0"/>
-              <a:t>A lone boot can be seen stuck in the mud, lost by an unfortunate traveller. </a:t>
-            </a:r>
-            <a:endParaRPr lang="en-GB" dirty="0" smtClean="0"/>
+              <a:rPr lang="en-GB" dirty="0"/>
+              <a:t>The ground underfoot is boggy and wet. There are small channels of water trickling between grassy mounds of earth and clumps reeds protruding from shallow pools of stagnant water. A lone boot can be seen stuck in the mud, lost by an unfortunate traveller. </a:t>
+            </a:r>
           </a:p>
         </p:txBody>
       </p:sp>
@@ -9635,16 +9233,12 @@
           </a:lstStyle>
           <a:p>
             <a:r>
-              <a:rPr lang="en-GB" sz="6000" dirty="0" smtClean="0">
+              <a:rPr lang="en-GB" sz="6000" dirty="0">
                 <a:latin typeface="Arial" panose="020B0604020202020204" pitchFamily="34" charset="0"/>
                 <a:cs typeface="Arial" panose="020B0604020202020204" pitchFamily="34" charset="0"/>
               </a:rPr>
               <a:t>River 7</a:t>
             </a:r>
-            <a:endParaRPr lang="en-GB" sz="6000" dirty="0">
-              <a:latin typeface="Arial" panose="020B0604020202020204" pitchFamily="34" charset="0"/>
-              <a:cs typeface="Arial" panose="020B0604020202020204" pitchFamily="34" charset="0"/>
-            </a:endParaRPr>
           </a:p>
         </p:txBody>
       </p:sp>
@@ -9670,10 +9264,9 @@
           <a:lstStyle/>
           <a:p>
             <a:r>
-              <a:rPr lang="en-GB" dirty="0" smtClean="0"/>
+              <a:rPr lang="en-GB" dirty="0"/>
               <a:t>The river has slowed down as it reaches the bottom of the valley and is starting to spread out into a number of smaller channels as it reaches the end of it’s course. A number of small stepping stones form a path across the once impassable river. </a:t>
             </a:r>
-            <a:endParaRPr lang="en-GB" dirty="0" smtClean="0"/>
           </a:p>
         </p:txBody>
       </p:sp>
@@ -9749,16 +9342,12 @@
           </a:lstStyle>
           <a:p>
             <a:r>
-              <a:rPr lang="en-GB" sz="6000" dirty="0" smtClean="0">
+              <a:rPr lang="en-GB" sz="6000" dirty="0">
                 <a:latin typeface="Arial" panose="020B0604020202020204" pitchFamily="34" charset="0"/>
                 <a:cs typeface="Arial" panose="020B0604020202020204" pitchFamily="34" charset="0"/>
               </a:rPr>
               <a:t>River 6</a:t>
             </a:r>
-            <a:endParaRPr lang="en-GB" sz="6000" dirty="0">
-              <a:latin typeface="Arial" panose="020B0604020202020204" pitchFamily="34" charset="0"/>
-              <a:cs typeface="Arial" panose="020B0604020202020204" pitchFamily="34" charset="0"/>
-            </a:endParaRPr>
           </a:p>
         </p:txBody>
       </p:sp>
@@ -9784,10 +9373,9 @@
           <a:lstStyle/>
           <a:p>
             <a:r>
-              <a:rPr lang="en-GB" dirty="0" smtClean="0"/>
+              <a:rPr lang="en-GB" dirty="0"/>
               <a:t>The river is starting to slow down as the valley becomes wider and flatter, the once gushing torrent is now a calm meandering flow. Occasionally a large fish can be seen leaping over the surface of the water, these great salmon are the prize many fishermen dream of catching.</a:t>
             </a:r>
-            <a:endParaRPr lang="en-GB" dirty="0" smtClean="0"/>
           </a:p>
         </p:txBody>
       </p:sp>
@@ -9863,16 +9451,12 @@
           </a:lstStyle>
           <a:p>
             <a:r>
-              <a:rPr lang="en-GB" sz="6000" dirty="0" smtClean="0">
+              <a:rPr lang="en-GB" sz="6000" dirty="0">
                 <a:latin typeface="Arial" panose="020B0604020202020204" pitchFamily="34" charset="0"/>
                 <a:cs typeface="Arial" panose="020B0604020202020204" pitchFamily="34" charset="0"/>
               </a:rPr>
               <a:t>Cobbled Road 3</a:t>
             </a:r>
-            <a:endParaRPr lang="en-GB" sz="6000" dirty="0">
-              <a:latin typeface="Arial" panose="020B0604020202020204" pitchFamily="34" charset="0"/>
-              <a:cs typeface="Arial" panose="020B0604020202020204" pitchFamily="34" charset="0"/>
-            </a:endParaRPr>
           </a:p>
         </p:txBody>
       </p:sp>
@@ -9898,14 +9482,9 @@
           <a:lstStyle/>
           <a:p>
             <a:r>
-              <a:rPr lang="en-GB" dirty="0" smtClean="0"/>
-              <a:t>The old cobbled road was onc</a:t>
-            </a:r>
-            <a:r>
-              <a:rPr lang="en-GB" dirty="0" smtClean="0"/>
-              <a:t>e busy with carts and horses, but now is seldom used. All the trade has left these parts and the heavy duty road now only sees the occasional traveller. At the end of the road is what remains of an old wooden stables, the roof has fallen in and only one of the walls is left fully intact.</a:t>
-            </a:r>
-            <a:endParaRPr lang="en-GB" dirty="0" smtClean="0"/>
+              <a:rPr lang="en-GB" dirty="0"/>
+              <a:t>The old cobbled road was once busy with carts and horses, but now is seldom used. All the trade has left these parts and the heavy duty road now only sees the occasional traveller. At the end of the road is what remains of an old wooden stables, the roof has fallen in and only one of the walls is left fully intact.</a:t>
+            </a:r>
           </a:p>
         </p:txBody>
       </p:sp>
@@ -9981,16 +9560,12 @@
           </a:lstStyle>
           <a:p>
             <a:r>
-              <a:rPr lang="en-GB" sz="6000" dirty="0" smtClean="0">
+              <a:rPr lang="en-GB" sz="6000" dirty="0">
                 <a:latin typeface="Arial" panose="020B0604020202020204" pitchFamily="34" charset="0"/>
                 <a:cs typeface="Arial" panose="020B0604020202020204" pitchFamily="34" charset="0"/>
               </a:rPr>
               <a:t>Cobbled Road 2</a:t>
             </a:r>
-            <a:endParaRPr lang="en-GB" sz="6000" dirty="0">
-              <a:latin typeface="Arial" panose="020B0604020202020204" pitchFamily="34" charset="0"/>
-              <a:cs typeface="Arial" panose="020B0604020202020204" pitchFamily="34" charset="0"/>
-            </a:endParaRPr>
           </a:p>
         </p:txBody>
       </p:sp>
@@ -10016,14 +9591,9 @@
           <a:lstStyle/>
           <a:p>
             <a:r>
-              <a:rPr lang="en-GB" dirty="0" smtClean="0"/>
-              <a:t>The old cobbled road was onc</a:t>
-            </a:r>
-            <a:r>
-              <a:rPr lang="en-GB" dirty="0" smtClean="0"/>
-              <a:t>e busy with carts and horses, but now is seldom used. All the trade has left these parts and the heavy duty road now only sees the occasional traveller. The gaps between the stones are filled with weeds and some of them have cracked. </a:t>
-            </a:r>
-            <a:endParaRPr lang="en-GB" dirty="0" smtClean="0"/>
+              <a:rPr lang="en-GB" dirty="0"/>
+              <a:t>The old cobbled road was once busy with carts and horses, but now is seldom used. All the trade has left these parts and the heavy duty road now only sees the occasional traveller. The gaps between the stones are filled with weeds and some of them have cracked. </a:t>
+            </a:r>
           </a:p>
         </p:txBody>
       </p:sp>
@@ -10099,16 +9669,12 @@
           </a:lstStyle>
           <a:p>
             <a:r>
-              <a:rPr lang="en-GB" sz="6000" dirty="0" smtClean="0">
+              <a:rPr lang="en-GB" sz="6000" dirty="0">
                 <a:latin typeface="Arial" panose="020B0604020202020204" pitchFamily="34" charset="0"/>
                 <a:cs typeface="Arial" panose="020B0604020202020204" pitchFamily="34" charset="0"/>
               </a:rPr>
               <a:t>Cobbled Road 1</a:t>
             </a:r>
-            <a:endParaRPr lang="en-GB" sz="6000" dirty="0">
-              <a:latin typeface="Arial" panose="020B0604020202020204" pitchFamily="34" charset="0"/>
-              <a:cs typeface="Arial" panose="020B0604020202020204" pitchFamily="34" charset="0"/>
-            </a:endParaRPr>
           </a:p>
         </p:txBody>
       </p:sp>
@@ -10134,14 +9700,9 @@
           <a:lstStyle/>
           <a:p>
             <a:r>
-              <a:rPr lang="en-GB" dirty="0" smtClean="0"/>
-              <a:t>The old cobbled road was onc</a:t>
-            </a:r>
-            <a:r>
-              <a:rPr lang="en-GB" dirty="0" smtClean="0"/>
-              <a:t>e busy with carts and horses, but now is seldom used. All the trade has left these parts and the heavy duty road now only sees the occasional traveller. This long straight road disappears off into the distance as far the eye can see.</a:t>
-            </a:r>
-            <a:endParaRPr lang="en-GB" dirty="0" smtClean="0"/>
+              <a:rPr lang="en-GB" dirty="0"/>
+              <a:t>The old cobbled road was once busy with carts and horses, but now is seldom used. All the trade has left these parts and the heavy duty road now only sees the occasional traveller. This long straight road disappears off into the distance as far the eye can see.</a:t>
+            </a:r>
           </a:p>
         </p:txBody>
       </p:sp>
@@ -10217,16 +9778,12 @@
           </a:lstStyle>
           <a:p>
             <a:r>
-              <a:rPr lang="en-GB" sz="6000" dirty="0" smtClean="0">
+              <a:rPr lang="en-GB" sz="6000" dirty="0">
                 <a:latin typeface="Arial" panose="020B0604020202020204" pitchFamily="34" charset="0"/>
                 <a:cs typeface="Arial" panose="020B0604020202020204" pitchFamily="34" charset="0"/>
               </a:rPr>
               <a:t>Cross Roads</a:t>
             </a:r>
-            <a:endParaRPr lang="en-GB" sz="6000" dirty="0">
-              <a:latin typeface="Arial" panose="020B0604020202020204" pitchFamily="34" charset="0"/>
-              <a:cs typeface="Arial" panose="020B0604020202020204" pitchFamily="34" charset="0"/>
-            </a:endParaRPr>
           </a:p>
         </p:txBody>
       </p:sp>
@@ -10252,14 +9809,9 @@
           <a:lstStyle/>
           <a:p>
             <a:r>
-              <a:rPr lang="en-GB" dirty="0" smtClean="0"/>
-              <a:t>A large oak tree stands just to one side of the cross roads with numerous signs nailed to it, many have become so badly damaged the writing on them is almost illegible. One sign, which looks far more recent than the rest, reads “Poor people have it, rich people need it, if you eat it you die, wha</a:t>
-            </a:r>
-            <a:r>
-              <a:rPr lang="en-GB" dirty="0" smtClean="0"/>
-              <a:t>t am I?”.</a:t>
-            </a:r>
-            <a:endParaRPr lang="en-GB" dirty="0" smtClean="0"/>
+              <a:rPr lang="en-GB" dirty="0"/>
+              <a:t>A large oak tree stands just to one side of the cross roads with numerous signs nailed to it, many have become so badly damaged the writing on them is almost illegible. One sign, which looks far more recent than the rest, reads “Poor people have it, rich people need it, if you eat it you die, what am I?”.</a:t>
+            </a:r>
           </a:p>
         </p:txBody>
       </p:sp>
@@ -10335,16 +9887,12 @@
           </a:lstStyle>
           <a:p>
             <a:r>
-              <a:rPr lang="en-GB" sz="6000" dirty="0" smtClean="0">
+              <a:rPr lang="en-GB" sz="6000" dirty="0">
                 <a:latin typeface="Arial" panose="020B0604020202020204" pitchFamily="34" charset="0"/>
                 <a:cs typeface="Arial" panose="020B0604020202020204" pitchFamily="34" charset="0"/>
               </a:rPr>
               <a:t>Graveyard</a:t>
             </a:r>
-            <a:endParaRPr lang="en-GB" sz="6000" dirty="0">
-              <a:latin typeface="Arial" panose="020B0604020202020204" pitchFamily="34" charset="0"/>
-              <a:cs typeface="Arial" panose="020B0604020202020204" pitchFamily="34" charset="0"/>
-            </a:endParaRPr>
           </a:p>
         </p:txBody>
       </p:sp>
@@ -10371,12 +9919,8 @@
           <a:lstStyle/>
           <a:p>
             <a:r>
-              <a:rPr lang="en-GB" dirty="0" smtClean="0"/>
-              <a:t>The air is still and nothing moves. The graves cast shadows so dark the ground looks to disappear completely beneath them. In the centre of the graveyards is a large marble tomb with an illegible inscription reading “</a:t>
-            </a:r>
-            <a:r>
               <a:rPr lang="en-GB" dirty="0"/>
-              <a:t>Gur </a:t>
+              <a:t>The air is still and nothing moves. The graves cast shadows so dark the ground looks to disappear completely beneath them. In the centre of the graveyards is a large marble tomb with an illegible inscription reading “Gur </a:t>
             </a:r>
             <a:r>
               <a:rPr lang="en-GB" dirty="0" err="1"/>
@@ -10488,13 +10032,8 @@
             </a:r>
             <a:r>
               <a:rPr lang="en-GB" dirty="0"/>
-              <a:t> </a:t>
-            </a:r>
-            <a:r>
-              <a:rPr lang="en-GB" dirty="0" smtClean="0"/>
-              <a:t>vg”.</a:t>
-            </a:r>
-            <a:endParaRPr lang="en-GB" dirty="0"/>
+              <a:t> vg”.</a:t>
+            </a:r>
           </a:p>
         </p:txBody>
       </p:sp>
@@ -10520,16 +10059,15 @@
           <a:lstStyle/>
           <a:p>
             <a:r>
-              <a:rPr lang="en-GB" b="1" dirty="0" smtClean="0"/>
+              <a:rPr lang="en-GB" b="1" dirty="0"/>
               <a:t>Open tomb:</a:t>
             </a:r>
           </a:p>
           <a:p>
             <a:r>
-              <a:rPr lang="en-GB" dirty="0" smtClean="0"/>
+              <a:rPr lang="en-GB" dirty="0"/>
               <a:t>Upon removing the lid, a narrow staircase is seen leading down into some sort of hidden crypt. It is pitch down there with the distinct sound of rattling bones emanating somewhere in the darkness.</a:t>
             </a:r>
-            <a:endParaRPr lang="en-GB" dirty="0"/>
           </a:p>
         </p:txBody>
       </p:sp>
@@ -10605,16 +10143,12 @@
           </a:lstStyle>
           <a:p>
             <a:r>
-              <a:rPr lang="en-GB" sz="6000" dirty="0" smtClean="0">
+              <a:rPr lang="en-GB" sz="6000" dirty="0">
                 <a:latin typeface="Arial" panose="020B0604020202020204" pitchFamily="34" charset="0"/>
                 <a:cs typeface="Arial" panose="020B0604020202020204" pitchFamily="34" charset="0"/>
               </a:rPr>
               <a:t>Dusty Road North</a:t>
             </a:r>
-            <a:endParaRPr lang="en-GB" sz="6000" dirty="0">
-              <a:latin typeface="Arial" panose="020B0604020202020204" pitchFamily="34" charset="0"/>
-              <a:cs typeface="Arial" panose="020B0604020202020204" pitchFamily="34" charset="0"/>
-            </a:endParaRPr>
           </a:p>
         </p:txBody>
       </p:sp>
@@ -10640,10 +10174,9 @@
           <a:lstStyle/>
           <a:p>
             <a:r>
-              <a:rPr lang="en-GB" dirty="0" smtClean="0"/>
+              <a:rPr lang="en-GB" dirty="0"/>
               <a:t>The road is barren and dusty, there is nothing much to be seen in either direction other than the occasional small bush and the odd bird flying overhead. The hot sun beating down on the road over the years has caused it to completely dry out and crack in place.</a:t>
             </a:r>
-            <a:endParaRPr lang="en-GB" dirty="0" smtClean="0"/>
           </a:p>
         </p:txBody>
       </p:sp>
@@ -10719,16 +10252,12 @@
           </a:lstStyle>
           <a:p>
             <a:r>
-              <a:rPr lang="en-GB" sz="6000" dirty="0" smtClean="0">
+              <a:rPr lang="en-GB" sz="6000" dirty="0">
                 <a:latin typeface="Arial" panose="020B0604020202020204" pitchFamily="34" charset="0"/>
                 <a:cs typeface="Arial" panose="020B0604020202020204" pitchFamily="34" charset="0"/>
               </a:rPr>
               <a:t>Cave</a:t>
             </a:r>
-            <a:endParaRPr lang="en-GB" sz="6000" dirty="0">
-              <a:latin typeface="Arial" panose="020B0604020202020204" pitchFamily="34" charset="0"/>
-              <a:cs typeface="Arial" panose="020B0604020202020204" pitchFamily="34" charset="0"/>
-            </a:endParaRPr>
           </a:p>
         </p:txBody>
       </p:sp>
@@ -10754,10 +10283,9 @@
           <a:lstStyle/>
           <a:p>
             <a:r>
-              <a:rPr lang="en-GB" dirty="0" smtClean="0"/>
+              <a:rPr lang="en-GB" dirty="0"/>
               <a:t>The cave is very dark and damp, there are large stalactites looming down the from the roof like giant monstrous teeth. There is a constant drip of water echoing throughout as it splashes against the hard stone floor. At the back of the cave is a pitch black tunnel leading down into the ground, it is too dark to see how far it goes.</a:t>
             </a:r>
-            <a:endParaRPr lang="en-GB" dirty="0" smtClean="0"/>
           </a:p>
         </p:txBody>
       </p:sp>
@@ -10833,16 +10361,12 @@
           </a:lstStyle>
           <a:p>
             <a:r>
-              <a:rPr lang="en-GB" sz="6000" dirty="0" smtClean="0">
+              <a:rPr lang="en-GB" sz="6000" dirty="0">
                 <a:latin typeface="Arial" panose="020B0604020202020204" pitchFamily="34" charset="0"/>
                 <a:cs typeface="Arial" panose="020B0604020202020204" pitchFamily="34" charset="0"/>
               </a:rPr>
               <a:t>Swamp 1</a:t>
             </a:r>
-            <a:endParaRPr lang="en-GB" sz="6000" dirty="0">
-              <a:latin typeface="Arial" panose="020B0604020202020204" pitchFamily="34" charset="0"/>
-              <a:cs typeface="Arial" panose="020B0604020202020204" pitchFamily="34" charset="0"/>
-            </a:endParaRPr>
           </a:p>
         </p:txBody>
       </p:sp>
@@ -10868,10 +10392,9 @@
           <a:lstStyle/>
           <a:p>
             <a:r>
-              <a:rPr lang="en-GB" dirty="0" smtClean="0"/>
+              <a:rPr lang="en-GB" dirty="0"/>
               <a:t>The trees growing out of the swamp seem lifeless and limp. All life looks like it has been drained out of them by the foul air, corrupted by the slow decay of everything around. The water in the swamp is lifeless, like all the oxygen was drained out long ago.</a:t>
             </a:r>
-            <a:endParaRPr lang="en-GB" dirty="0"/>
           </a:p>
         </p:txBody>
       </p:sp>
@@ -10947,16 +10470,12 @@
           </a:lstStyle>
           <a:p>
             <a:r>
-              <a:rPr lang="en-GB" sz="6000" dirty="0" smtClean="0">
+              <a:rPr lang="en-GB" sz="6000" dirty="0">
                 <a:latin typeface="Arial" panose="020B0604020202020204" pitchFamily="34" charset="0"/>
                 <a:cs typeface="Arial" panose="020B0604020202020204" pitchFamily="34" charset="0"/>
               </a:rPr>
               <a:t>Marsh 1</a:t>
             </a:r>
-            <a:endParaRPr lang="en-GB" sz="6000" dirty="0">
-              <a:latin typeface="Arial" panose="020B0604020202020204" pitchFamily="34" charset="0"/>
-              <a:cs typeface="Arial" panose="020B0604020202020204" pitchFamily="34" charset="0"/>
-            </a:endParaRPr>
           </a:p>
         </p:txBody>
       </p:sp>
@@ -10982,22 +10501,9 @@
           <a:lstStyle/>
           <a:p>
             <a:r>
-              <a:rPr lang="en-GB" dirty="0" smtClean="0"/>
-              <a:t>The ground underfoot is boggy and wet. There are small channels of water trickling between grassy mounds of earth and clumps reeds protruding </a:t>
-            </a:r>
-            <a:r>
-              <a:rPr lang="en-GB" dirty="0" smtClean="0"/>
-              <a:t>from </a:t>
-            </a:r>
-            <a:r>
-              <a:rPr lang="en-GB" dirty="0" smtClean="0"/>
-              <a:t>shallow pools of stagnant water</a:t>
-            </a:r>
-            <a:r>
-              <a:rPr lang="en-GB" dirty="0" smtClean="0"/>
-              <a:t>. Apparently the leeches of the marsh have uses in medicine to cure the blood from toxins.</a:t>
-            </a:r>
-            <a:endParaRPr lang="en-GB" dirty="0" smtClean="0"/>
+              <a:rPr lang="en-GB" dirty="0"/>
+              <a:t>The ground underfoot is boggy and wet. There are small channels of water trickling between grassy mounds of earth and clumps reeds protruding from shallow pools of stagnant water. Apparently the leeches of the marsh have uses in medicine to cure the blood from toxins.</a:t>
+            </a:r>
           </a:p>
         </p:txBody>
       </p:sp>
@@ -11073,16 +10579,12 @@
           </a:lstStyle>
           <a:p>
             <a:r>
-              <a:rPr lang="en-GB" sz="6000" dirty="0" smtClean="0">
+              <a:rPr lang="en-GB" sz="6000" dirty="0">
                 <a:latin typeface="Arial" panose="020B0604020202020204" pitchFamily="34" charset="0"/>
                 <a:cs typeface="Arial" panose="020B0604020202020204" pitchFamily="34" charset="0"/>
               </a:rPr>
               <a:t>Waterlogged Field</a:t>
             </a:r>
-            <a:endParaRPr lang="en-GB" sz="6000" dirty="0">
-              <a:latin typeface="Arial" panose="020B0604020202020204" pitchFamily="34" charset="0"/>
-              <a:cs typeface="Arial" panose="020B0604020202020204" pitchFamily="34" charset="0"/>
-            </a:endParaRPr>
           </a:p>
         </p:txBody>
       </p:sp>
@@ -11108,10 +10610,9 @@
           <a:lstStyle/>
           <a:p>
             <a:r>
-              <a:rPr lang="en-GB" dirty="0" smtClean="0"/>
+              <a:rPr lang="en-GB" dirty="0"/>
               <a:t>Once a field full of crops, this field is now boggy and sodden with water. It is slowly being swallowed by the marsh and the encroaching river. The once fertile land is now barren and empty, it is no longer possible to grow crops in the field as if all of the life has been washed out of the soil.</a:t>
             </a:r>
-            <a:endParaRPr lang="en-GB" dirty="0" smtClean="0"/>
           </a:p>
         </p:txBody>
       </p:sp>
@@ -11187,16 +10688,12 @@
           </a:lstStyle>
           <a:p>
             <a:r>
-              <a:rPr lang="en-GB" sz="6000" dirty="0" smtClean="0">
+              <a:rPr lang="en-GB" sz="6000" dirty="0">
                 <a:latin typeface="Arial" panose="020B0604020202020204" pitchFamily="34" charset="0"/>
                 <a:cs typeface="Arial" panose="020B0604020202020204" pitchFamily="34" charset="0"/>
               </a:rPr>
               <a:t>Corn Field 2</a:t>
             </a:r>
-            <a:endParaRPr lang="en-GB" sz="6000" dirty="0">
-              <a:latin typeface="Arial" panose="020B0604020202020204" pitchFamily="34" charset="0"/>
-              <a:cs typeface="Arial" panose="020B0604020202020204" pitchFamily="34" charset="0"/>
-            </a:endParaRPr>
           </a:p>
         </p:txBody>
       </p:sp>
@@ -11222,18 +10719,9 @@
           <a:lstStyle/>
           <a:p>
             <a:r>
-              <a:rPr lang="en-GB" dirty="0" smtClean="0"/>
-              <a:t>The field is filled with tall corn plants as far as the eye can see. </a:t>
-            </a:r>
-            <a:r>
               <a:rPr lang="en-GB" dirty="0"/>
-              <a:t>They reach up into the sky, nearly 10 feet tall, covering vast areas of land like a vast impenetrable maze. </a:t>
-            </a:r>
-            <a:r>
-              <a:rPr lang="en-GB" dirty="0" smtClean="0"/>
-              <a:t>An elderly farmer is harvesting some of his crop around the edges of the field with a small sickle. </a:t>
-            </a:r>
-            <a:endParaRPr lang="en-GB" dirty="0" smtClean="0"/>
+              <a:t>The field is filled with tall corn plants as far as the eye can see. They reach up into the sky, nearly 10 feet tall, covering vast areas of land like a vast impenetrable maze. An elderly farmer is harvesting some of his crop around the edges of the field with a small sickle. </a:t>
+            </a:r>
           </a:p>
         </p:txBody>
       </p:sp>
@@ -11309,16 +10797,12 @@
           </a:lstStyle>
           <a:p>
             <a:r>
-              <a:rPr lang="en-GB" sz="6000" dirty="0" smtClean="0">
+              <a:rPr lang="en-GB" sz="6000" dirty="0">
                 <a:latin typeface="Arial" panose="020B0604020202020204" pitchFamily="34" charset="0"/>
                 <a:cs typeface="Arial" panose="020B0604020202020204" pitchFamily="34" charset="0"/>
               </a:rPr>
               <a:t>Corn Field 1</a:t>
             </a:r>
-            <a:endParaRPr lang="en-GB" sz="6000" dirty="0">
-              <a:latin typeface="Arial" panose="020B0604020202020204" pitchFamily="34" charset="0"/>
-              <a:cs typeface="Arial" panose="020B0604020202020204" pitchFamily="34" charset="0"/>
-            </a:endParaRPr>
           </a:p>
         </p:txBody>
       </p:sp>
@@ -11345,13 +10829,8 @@
           <a:p>
             <a:r>
               <a:rPr lang="en-GB" dirty="0"/>
-              <a:t>The field is filled with tall corn plants as far as the eye can see. </a:t>
-            </a:r>
-            <a:r>
-              <a:rPr lang="en-GB" dirty="0" smtClean="0"/>
-              <a:t>They reach up into the sky, nearly 10 feet tall, covering vast areas of land like a vast impenetrable maze. At the centre of this field is a large lifeless scarecrow seen sticking up above the corn. </a:t>
-            </a:r>
-            <a:endParaRPr lang="en-GB" dirty="0"/>
+              <a:t>The field is filled with tall corn plants as far as the eye can see. They reach up into the sky, nearly 10 feet tall, covering vast areas of land like a vast impenetrable maze. At the centre of this field is a large lifeless scarecrow seen sticking up above the corn. </a:t>
+            </a:r>
           </a:p>
         </p:txBody>
       </p:sp>
@@ -11427,16 +10906,12 @@
           </a:lstStyle>
           <a:p>
             <a:r>
-              <a:rPr lang="en-GB" sz="6000" dirty="0" smtClean="0">
+              <a:rPr lang="en-GB" sz="6000" dirty="0">
                 <a:latin typeface="Arial" panose="020B0604020202020204" pitchFamily="34" charset="0"/>
                 <a:cs typeface="Arial" panose="020B0604020202020204" pitchFamily="34" charset="0"/>
               </a:rPr>
               <a:t>Back Garden (Inn)</a:t>
             </a:r>
-            <a:endParaRPr lang="en-GB" sz="6000" dirty="0">
-              <a:latin typeface="Arial" panose="020B0604020202020204" pitchFamily="34" charset="0"/>
-              <a:cs typeface="Arial" panose="020B0604020202020204" pitchFamily="34" charset="0"/>
-            </a:endParaRPr>
           </a:p>
         </p:txBody>
       </p:sp>
@@ -11462,10 +10937,9 @@
           <a:lstStyle/>
           <a:p>
             <a:r>
-              <a:rPr lang="en-GB" dirty="0" smtClean="0"/>
+              <a:rPr lang="en-GB" dirty="0"/>
               <a:t>This garden is very neatly kept, within the confines of a large wooden fence. There are various herbs growing in small running along the back wall of the inn, and a large vegetable patch at the far end of the garden. The is a small tool shed in the back corner of the garden, locked with a large metal padlock.</a:t>
             </a:r>
-            <a:endParaRPr lang="en-GB" dirty="0" smtClean="0"/>
           </a:p>
         </p:txBody>
       </p:sp>
@@ -11541,16 +11015,12 @@
           </a:lstStyle>
           <a:p>
             <a:r>
-              <a:rPr lang="en-GB" sz="6000" dirty="0" smtClean="0">
+              <a:rPr lang="en-GB" sz="6000" dirty="0">
                 <a:latin typeface="Arial" panose="020B0604020202020204" pitchFamily="34" charset="0"/>
                 <a:cs typeface="Arial" panose="020B0604020202020204" pitchFamily="34" charset="0"/>
               </a:rPr>
               <a:t>Old Inn</a:t>
             </a:r>
-            <a:endParaRPr lang="en-GB" sz="6000" dirty="0">
-              <a:latin typeface="Arial" panose="020B0604020202020204" pitchFamily="34" charset="0"/>
-              <a:cs typeface="Arial" panose="020B0604020202020204" pitchFamily="34" charset="0"/>
-            </a:endParaRPr>
           </a:p>
         </p:txBody>
       </p:sp>
@@ -11576,10 +11046,9 @@
           <a:lstStyle/>
           <a:p>
             <a:r>
-              <a:rPr lang="en-GB" dirty="0" smtClean="0"/>
+              <a:rPr lang="en-GB" dirty="0"/>
               <a:t>The inn is almost empty apart from a drunken looking patron passed out in the corner, and the weary looking inn keeper stood behind the bar. There is the pleasant smell of something cooking coming from a kitchen just out of sight. The inn looks like its last legs and could do with a good lick of paint.</a:t>
             </a:r>
-            <a:endParaRPr lang="en-GB" dirty="0" smtClean="0"/>
           </a:p>
         </p:txBody>
       </p:sp>
@@ -11655,16 +11124,12 @@
           </a:lstStyle>
           <a:p>
             <a:r>
-              <a:rPr lang="en-GB" sz="6000" dirty="0" smtClean="0">
+              <a:rPr lang="en-GB" sz="6000" dirty="0">
                 <a:latin typeface="Arial" panose="020B0604020202020204" pitchFamily="34" charset="0"/>
                 <a:cs typeface="Arial" panose="020B0604020202020204" pitchFamily="34" charset="0"/>
               </a:rPr>
               <a:t>Dust Road West</a:t>
             </a:r>
-            <a:endParaRPr lang="en-GB" sz="6000" dirty="0">
-              <a:latin typeface="Arial" panose="020B0604020202020204" pitchFamily="34" charset="0"/>
-              <a:cs typeface="Arial" panose="020B0604020202020204" pitchFamily="34" charset="0"/>
-            </a:endParaRPr>
           </a:p>
         </p:txBody>
       </p:sp>
@@ -11690,18 +11155,17 @@
           <a:lstStyle/>
           <a:p>
             <a:r>
-              <a:rPr lang="en-GB" dirty="0" smtClean="0"/>
+              <a:rPr lang="en-GB" dirty="0"/>
               <a:t>The road is barren and dusty, there is nothing much to be seen in either direction other than the occasional small bush and the odd bird flying overhead. A tumble weed blows slowly across the </a:t>
             </a:r>
             <a:r>
-              <a:rPr lang="en-GB" dirty="0" err="1" smtClean="0"/>
+              <a:rPr lang="en-GB" dirty="0" err="1"/>
               <a:t>descolate</a:t>
             </a:r>
             <a:r>
-              <a:rPr lang="en-GB" dirty="0" smtClean="0"/>
+              <a:rPr lang="en-GB" dirty="0"/>
               <a:t> and empty road.</a:t>
             </a:r>
-            <a:endParaRPr lang="en-GB" dirty="0" smtClean="0"/>
           </a:p>
         </p:txBody>
       </p:sp>
@@ -11777,16 +11241,12 @@
           </a:lstStyle>
           <a:p>
             <a:r>
-              <a:rPr lang="en-GB" sz="6000" dirty="0" smtClean="0">
+              <a:rPr lang="en-GB" sz="6000" dirty="0">
                 <a:latin typeface="Arial" panose="020B0604020202020204" pitchFamily="34" charset="0"/>
                 <a:cs typeface="Arial" panose="020B0604020202020204" pitchFamily="34" charset="0"/>
               </a:rPr>
               <a:t>Quarry</a:t>
             </a:r>
-            <a:endParaRPr lang="en-GB" sz="6000" dirty="0">
-              <a:latin typeface="Arial" panose="020B0604020202020204" pitchFamily="34" charset="0"/>
-              <a:cs typeface="Arial" panose="020B0604020202020204" pitchFamily="34" charset="0"/>
-            </a:endParaRPr>
           </a:p>
         </p:txBody>
       </p:sp>
@@ -11813,10 +11273,9 @@
           <a:lstStyle/>
           <a:p>
             <a:r>
-              <a:rPr lang="en-GB" dirty="0" smtClean="0"/>
+              <a:rPr lang="en-GB" dirty="0"/>
               <a:t>The quarry, once a booming source of minerals and precious stones, was closed under the rule of the Iron Queen. It looks like it has been unused for some time. However, the mine carts are still fool and there are tools scattered around. </a:t>
             </a:r>
-            <a:endParaRPr lang="en-GB" dirty="0"/>
           </a:p>
         </p:txBody>
       </p:sp>
@@ -11842,16 +11301,15 @@
           <a:lstStyle/>
           <a:p>
             <a:r>
-              <a:rPr lang="en-GB" b="1" dirty="0" smtClean="0"/>
+              <a:rPr lang="en-GB" b="1" dirty="0"/>
               <a:t>Pick up Pickaxe:</a:t>
             </a:r>
           </a:p>
           <a:p>
             <a:r>
-              <a:rPr lang="en-GB" dirty="0" smtClean="0"/>
+              <a:rPr lang="en-GB" dirty="0"/>
               <a:t>A hefty workman's pickaxe. Perfect for smashing. </a:t>
             </a:r>
-            <a:endParaRPr lang="en-GB" dirty="0"/>
           </a:p>
         </p:txBody>
       </p:sp>
@@ -11927,16 +11385,12 @@
           </a:lstStyle>
           <a:p>
             <a:r>
-              <a:rPr lang="en-GB" sz="6000" dirty="0" smtClean="0">
+              <a:rPr lang="en-GB" sz="6000" dirty="0">
                 <a:latin typeface="Arial" panose="020B0604020202020204" pitchFamily="34" charset="0"/>
                 <a:cs typeface="Arial" panose="020B0604020202020204" pitchFamily="34" charset="0"/>
               </a:rPr>
               <a:t>Broken Cart</a:t>
             </a:r>
-            <a:endParaRPr lang="en-GB" sz="6000" dirty="0">
-              <a:latin typeface="Arial" panose="020B0604020202020204" pitchFamily="34" charset="0"/>
-              <a:cs typeface="Arial" panose="020B0604020202020204" pitchFamily="34" charset="0"/>
-            </a:endParaRPr>
           </a:p>
         </p:txBody>
       </p:sp>
@@ -11962,14 +11416,9 @@
           <a:lstStyle/>
           <a:p>
             <a:r>
-              <a:rPr lang="en-GB" dirty="0" smtClean="0"/>
-              <a:t>A broken cart lies by the side of the dusty road. </a:t>
-            </a:r>
-            <a:r>
-              <a:rPr lang="en-GB" dirty="0" smtClean="0"/>
-              <a:t>One of its wheels has broken off and rolled away, stopped by a dead tree trunk on the opposite side of the road. The empty crates and barrels the cart was carrying have fallen out and are strewn all over the side of the road.  </a:t>
-            </a:r>
-            <a:endParaRPr lang="en-GB" dirty="0" smtClean="0"/>
+              <a:rPr lang="en-GB" dirty="0"/>
+              <a:t>A broken cart lies by the side of the dusty road. One of its wheels has broken off and rolled away, stopped by a dead tree trunk on the opposite side of the road. The empty crates and barrels the cart was carrying have fallen out and are strewn all over the side of the road.  </a:t>
+            </a:r>
           </a:p>
         </p:txBody>
       </p:sp>
@@ -12045,16 +11494,12 @@
           </a:lstStyle>
           <a:p>
             <a:r>
-              <a:rPr lang="en-GB" sz="6000" dirty="0" smtClean="0">
+              <a:rPr lang="en-GB" sz="6000" dirty="0">
                 <a:latin typeface="Arial" panose="020B0604020202020204" pitchFamily="34" charset="0"/>
                 <a:cs typeface="Arial" panose="020B0604020202020204" pitchFamily="34" charset="0"/>
               </a:rPr>
               <a:t>Mountains</a:t>
             </a:r>
-            <a:endParaRPr lang="en-GB" sz="6000" dirty="0">
-              <a:latin typeface="Arial" panose="020B0604020202020204" pitchFamily="34" charset="0"/>
-              <a:cs typeface="Arial" panose="020B0604020202020204" pitchFamily="34" charset="0"/>
-            </a:endParaRPr>
           </a:p>
         </p:txBody>
       </p:sp>
@@ -12080,10 +11525,9 @@
           <a:lstStyle/>
           <a:p>
             <a:r>
-              <a:rPr lang="en-GB" dirty="0" smtClean="0"/>
+              <a:rPr lang="en-GB" dirty="0"/>
               <a:t>The snow topped mountains disappear upwards into the sky in a series of steep ridges and vast tundra's. The wind is Icey and bites straight down to the bone. Surely nothing could survive in these freezing conditions.</a:t>
             </a:r>
-            <a:endParaRPr lang="en-GB" dirty="0"/>
           </a:p>
         </p:txBody>
       </p:sp>
@@ -12159,16 +11603,12 @@
           </a:lstStyle>
           <a:p>
             <a:r>
-              <a:rPr lang="en-GB" sz="6000" dirty="0" smtClean="0">
+              <a:rPr lang="en-GB" sz="6000" dirty="0">
                 <a:latin typeface="Arial" panose="020B0604020202020204" pitchFamily="34" charset="0"/>
                 <a:cs typeface="Arial" panose="020B0604020202020204" pitchFamily="34" charset="0"/>
               </a:rPr>
               <a:t>Mountains 2</a:t>
             </a:r>
-            <a:endParaRPr lang="en-GB" sz="6000" dirty="0">
-              <a:latin typeface="Arial" panose="020B0604020202020204" pitchFamily="34" charset="0"/>
-              <a:cs typeface="Arial" panose="020B0604020202020204" pitchFamily="34" charset="0"/>
-            </a:endParaRPr>
           </a:p>
         </p:txBody>
       </p:sp>
@@ -12194,18 +11634,17 @@
           <a:lstStyle/>
           <a:p>
             <a:r>
-              <a:rPr lang="en-GB" dirty="0" smtClean="0"/>
+              <a:rPr lang="en-GB" dirty="0"/>
               <a:t>The snow topped mountains disappear upwards into the sky in a series of steep ridges and vast </a:t>
             </a:r>
             <a:r>
-              <a:rPr lang="en-GB" dirty="0" err="1" smtClean="0"/>
+              <a:rPr lang="en-GB" dirty="0" err="1"/>
               <a:t>tundras</a:t>
             </a:r>
             <a:r>
-              <a:rPr lang="en-GB" dirty="0" smtClean="0"/>
+              <a:rPr lang="en-GB" dirty="0"/>
               <a:t>. The wind is Icey and bites straight down to the bone. There is the faint rumble of an avalanche in the distance which almost sounds like a deep booming voice, carried across the vast peaks.</a:t>
             </a:r>
-            <a:endParaRPr lang="en-GB" dirty="0"/>
           </a:p>
         </p:txBody>
       </p:sp>

</xml_diff>

<commit_message>
AB - First 4 locations of row 4 added
</commit_message>
<xml_diff>
--- a/GroudLevelMap.pptx
+++ b/GroudLevelMap.pptx
@@ -269,7 +269,7 @@
           <a:p>
             <a:fld id="{4324A8F5-F1ED-4D05-8890-CA30F1CF831D}" type="datetimeFigureOut">
               <a:rPr lang="en-GB" smtClean="0"/>
-              <a:t>11/10/2016</a:t>
+              <a:t>20/10/2016</a:t>
             </a:fld>
             <a:endParaRPr lang="en-GB"/>
           </a:p>
@@ -885,7 +885,7 @@
           <a:p>
             <a:fld id="{E84557DF-487D-4A7D-AC14-41C025B26206}" type="datetimeFigureOut">
               <a:rPr lang="en-GB" smtClean="0"/>
-              <a:t>11/10/2016</a:t>
+              <a:t>20/10/2016</a:t>
             </a:fld>
             <a:endParaRPr lang="en-GB"/>
           </a:p>
@@ -1055,7 +1055,7 @@
           <a:p>
             <a:fld id="{E84557DF-487D-4A7D-AC14-41C025B26206}" type="datetimeFigureOut">
               <a:rPr lang="en-GB" smtClean="0"/>
-              <a:t>11/10/2016</a:t>
+              <a:t>20/10/2016</a:t>
             </a:fld>
             <a:endParaRPr lang="en-GB"/>
           </a:p>
@@ -1235,7 +1235,7 @@
           <a:p>
             <a:fld id="{E84557DF-487D-4A7D-AC14-41C025B26206}" type="datetimeFigureOut">
               <a:rPr lang="en-GB" smtClean="0"/>
-              <a:t>11/10/2016</a:t>
+              <a:t>20/10/2016</a:t>
             </a:fld>
             <a:endParaRPr lang="en-GB"/>
           </a:p>
@@ -1405,7 +1405,7 @@
           <a:p>
             <a:fld id="{E84557DF-487D-4A7D-AC14-41C025B26206}" type="datetimeFigureOut">
               <a:rPr lang="en-GB" smtClean="0"/>
-              <a:t>11/10/2016</a:t>
+              <a:t>20/10/2016</a:t>
             </a:fld>
             <a:endParaRPr lang="en-GB"/>
           </a:p>
@@ -1651,7 +1651,7 @@
           <a:p>
             <a:fld id="{E84557DF-487D-4A7D-AC14-41C025B26206}" type="datetimeFigureOut">
               <a:rPr lang="en-GB" smtClean="0"/>
-              <a:t>11/10/2016</a:t>
+              <a:t>20/10/2016</a:t>
             </a:fld>
             <a:endParaRPr lang="en-GB"/>
           </a:p>
@@ -1883,7 +1883,7 @@
           <a:p>
             <a:fld id="{E84557DF-487D-4A7D-AC14-41C025B26206}" type="datetimeFigureOut">
               <a:rPr lang="en-GB" smtClean="0"/>
-              <a:t>11/10/2016</a:t>
+              <a:t>20/10/2016</a:t>
             </a:fld>
             <a:endParaRPr lang="en-GB"/>
           </a:p>
@@ -2250,7 +2250,7 @@
           <a:p>
             <a:fld id="{E84557DF-487D-4A7D-AC14-41C025B26206}" type="datetimeFigureOut">
               <a:rPr lang="en-GB" smtClean="0"/>
-              <a:t>11/10/2016</a:t>
+              <a:t>20/10/2016</a:t>
             </a:fld>
             <a:endParaRPr lang="en-GB"/>
           </a:p>
@@ -2368,7 +2368,7 @@
           <a:p>
             <a:fld id="{E84557DF-487D-4A7D-AC14-41C025B26206}" type="datetimeFigureOut">
               <a:rPr lang="en-GB" smtClean="0"/>
-              <a:t>11/10/2016</a:t>
+              <a:t>20/10/2016</a:t>
             </a:fld>
             <a:endParaRPr lang="en-GB"/>
           </a:p>
@@ -2463,7 +2463,7 @@
           <a:p>
             <a:fld id="{E84557DF-487D-4A7D-AC14-41C025B26206}" type="datetimeFigureOut">
               <a:rPr lang="en-GB" smtClean="0"/>
-              <a:t>11/10/2016</a:t>
+              <a:t>20/10/2016</a:t>
             </a:fld>
             <a:endParaRPr lang="en-GB"/>
           </a:p>
@@ -2740,7 +2740,7 @@
           <a:p>
             <a:fld id="{E84557DF-487D-4A7D-AC14-41C025B26206}" type="datetimeFigureOut">
               <a:rPr lang="en-GB" smtClean="0"/>
-              <a:t>11/10/2016</a:t>
+              <a:t>20/10/2016</a:t>
             </a:fld>
             <a:endParaRPr lang="en-GB"/>
           </a:p>
@@ -2993,7 +2993,7 @@
           <a:p>
             <a:fld id="{E84557DF-487D-4A7D-AC14-41C025B26206}" type="datetimeFigureOut">
               <a:rPr lang="en-GB" smtClean="0"/>
-              <a:t>11/10/2016</a:t>
+              <a:t>20/10/2016</a:t>
             </a:fld>
             <a:endParaRPr lang="en-GB"/>
           </a:p>
@@ -3206,7 +3206,7 @@
           <a:p>
             <a:fld id="{E84557DF-487D-4A7D-AC14-41C025B26206}" type="datetimeFigureOut">
               <a:rPr lang="en-GB" smtClean="0"/>
-              <a:t>11/10/2016</a:t>
+              <a:t>20/10/2016</a:t>
             </a:fld>
             <a:endParaRPr lang="en-GB"/>
           </a:p>
@@ -7101,8 +7101,8 @@
         </p:nvSpPr>
         <p:spPr>
           <a:xfrm>
-            <a:off x="3933823" y="2765426"/>
-            <a:ext cx="4743452" cy="520091"/>
+            <a:off x="3933822" y="2765426"/>
+            <a:ext cx="5795393" cy="520091"/>
           </a:xfrm>
           <a:prstGeom prst="rect">
             <a:avLst/>
@@ -7137,7 +7137,7 @@
                 <a:latin typeface="Arial" panose="020B0604020202020204" pitchFamily="34" charset="0"/>
                 <a:cs typeface="Arial" panose="020B0604020202020204" pitchFamily="34" charset="0"/>
               </a:rPr>
-              <a:t>Flood Plains</a:t>
+              <a:t>Flood Plains 2</a:t>
             </a:r>
           </a:p>
         </p:txBody>
@@ -7211,8 +7211,8 @@
         </p:nvSpPr>
         <p:spPr>
           <a:xfrm>
-            <a:off x="3933823" y="2670176"/>
-            <a:ext cx="4743452" cy="520091"/>
+            <a:off x="3933822" y="2670176"/>
+            <a:ext cx="5722241" cy="520091"/>
           </a:xfrm>
           <a:prstGeom prst="rect">
             <a:avLst/>
@@ -7247,7 +7247,7 @@
                 <a:latin typeface="Arial" panose="020B0604020202020204" pitchFamily="34" charset="0"/>
                 <a:cs typeface="Arial" panose="020B0604020202020204" pitchFamily="34" charset="0"/>
               </a:rPr>
-              <a:t>Flood Plains</a:t>
+              <a:t>Flood Plains 1</a:t>
             </a:r>
           </a:p>
         </p:txBody>

</xml_diff>

<commit_message>
AB - Rest of 4th row locations added
</commit_message>
<xml_diff>
--- a/GroudLevelMap.pptx
+++ b/GroudLevelMap.pptx
@@ -269,7 +269,7 @@
           <a:p>
             <a:fld id="{4324A8F5-F1ED-4D05-8890-CA30F1CF831D}" type="datetimeFigureOut">
               <a:rPr lang="en-GB" smtClean="0"/>
-              <a:t>20/10/2016</a:t>
+              <a:t>21/10/2016</a:t>
             </a:fld>
             <a:endParaRPr lang="en-GB"/>
           </a:p>
@@ -885,7 +885,7 @@
           <a:p>
             <a:fld id="{E84557DF-487D-4A7D-AC14-41C025B26206}" type="datetimeFigureOut">
               <a:rPr lang="en-GB" smtClean="0"/>
-              <a:t>20/10/2016</a:t>
+              <a:t>21/10/2016</a:t>
             </a:fld>
             <a:endParaRPr lang="en-GB"/>
           </a:p>
@@ -1055,7 +1055,7 @@
           <a:p>
             <a:fld id="{E84557DF-487D-4A7D-AC14-41C025B26206}" type="datetimeFigureOut">
               <a:rPr lang="en-GB" smtClean="0"/>
-              <a:t>20/10/2016</a:t>
+              <a:t>21/10/2016</a:t>
             </a:fld>
             <a:endParaRPr lang="en-GB"/>
           </a:p>
@@ -1235,7 +1235,7 @@
           <a:p>
             <a:fld id="{E84557DF-487D-4A7D-AC14-41C025B26206}" type="datetimeFigureOut">
               <a:rPr lang="en-GB" smtClean="0"/>
-              <a:t>20/10/2016</a:t>
+              <a:t>21/10/2016</a:t>
             </a:fld>
             <a:endParaRPr lang="en-GB"/>
           </a:p>
@@ -1405,7 +1405,7 @@
           <a:p>
             <a:fld id="{E84557DF-487D-4A7D-AC14-41C025B26206}" type="datetimeFigureOut">
               <a:rPr lang="en-GB" smtClean="0"/>
-              <a:t>20/10/2016</a:t>
+              <a:t>21/10/2016</a:t>
             </a:fld>
             <a:endParaRPr lang="en-GB"/>
           </a:p>
@@ -1651,7 +1651,7 @@
           <a:p>
             <a:fld id="{E84557DF-487D-4A7D-AC14-41C025B26206}" type="datetimeFigureOut">
               <a:rPr lang="en-GB" smtClean="0"/>
-              <a:t>20/10/2016</a:t>
+              <a:t>21/10/2016</a:t>
             </a:fld>
             <a:endParaRPr lang="en-GB"/>
           </a:p>
@@ -1883,7 +1883,7 @@
           <a:p>
             <a:fld id="{E84557DF-487D-4A7D-AC14-41C025B26206}" type="datetimeFigureOut">
               <a:rPr lang="en-GB" smtClean="0"/>
-              <a:t>20/10/2016</a:t>
+              <a:t>21/10/2016</a:t>
             </a:fld>
             <a:endParaRPr lang="en-GB"/>
           </a:p>
@@ -2250,7 +2250,7 @@
           <a:p>
             <a:fld id="{E84557DF-487D-4A7D-AC14-41C025B26206}" type="datetimeFigureOut">
               <a:rPr lang="en-GB" smtClean="0"/>
-              <a:t>20/10/2016</a:t>
+              <a:t>21/10/2016</a:t>
             </a:fld>
             <a:endParaRPr lang="en-GB"/>
           </a:p>
@@ -2368,7 +2368,7 @@
           <a:p>
             <a:fld id="{E84557DF-487D-4A7D-AC14-41C025B26206}" type="datetimeFigureOut">
               <a:rPr lang="en-GB" smtClean="0"/>
-              <a:t>20/10/2016</a:t>
+              <a:t>21/10/2016</a:t>
             </a:fld>
             <a:endParaRPr lang="en-GB"/>
           </a:p>
@@ -2463,7 +2463,7 @@
           <a:p>
             <a:fld id="{E84557DF-487D-4A7D-AC14-41C025B26206}" type="datetimeFigureOut">
               <a:rPr lang="en-GB" smtClean="0"/>
-              <a:t>20/10/2016</a:t>
+              <a:t>21/10/2016</a:t>
             </a:fld>
             <a:endParaRPr lang="en-GB"/>
           </a:p>
@@ -2740,7 +2740,7 @@
           <a:p>
             <a:fld id="{E84557DF-487D-4A7D-AC14-41C025B26206}" type="datetimeFigureOut">
               <a:rPr lang="en-GB" smtClean="0"/>
-              <a:t>20/10/2016</a:t>
+              <a:t>21/10/2016</a:t>
             </a:fld>
             <a:endParaRPr lang="en-GB"/>
           </a:p>
@@ -2993,7 +2993,7 @@
           <a:p>
             <a:fld id="{E84557DF-487D-4A7D-AC14-41C025B26206}" type="datetimeFigureOut">
               <a:rPr lang="en-GB" smtClean="0"/>
-              <a:t>20/10/2016</a:t>
+              <a:t>21/10/2016</a:t>
             </a:fld>
             <a:endParaRPr lang="en-GB"/>
           </a:p>
@@ -3206,7 +3206,7 @@
           <a:p>
             <a:fld id="{E84557DF-487D-4A7D-AC14-41C025B26206}" type="datetimeFigureOut">
               <a:rPr lang="en-GB" smtClean="0"/>
-              <a:t>20/10/2016</a:t>
+              <a:t>21/10/2016</a:t>
             </a:fld>
             <a:endParaRPr lang="en-GB"/>
           </a:p>

</xml_diff>

<commit_message>
AB - Added first 4 zones of row 5
</commit_message>
<xml_diff>
--- a/GroudLevelMap.pptx
+++ b/GroudLevelMap.pptx
@@ -269,7 +269,7 @@
           <a:p>
             <a:fld id="{4324A8F5-F1ED-4D05-8890-CA30F1CF831D}" type="datetimeFigureOut">
               <a:rPr lang="en-GB" smtClean="0"/>
-              <a:t>21/10/2016</a:t>
+              <a:t>22/10/2016</a:t>
             </a:fld>
             <a:endParaRPr lang="en-GB"/>
           </a:p>
@@ -885,7 +885,7 @@
           <a:p>
             <a:fld id="{E84557DF-487D-4A7D-AC14-41C025B26206}" type="datetimeFigureOut">
               <a:rPr lang="en-GB" smtClean="0"/>
-              <a:t>21/10/2016</a:t>
+              <a:t>22/10/2016</a:t>
             </a:fld>
             <a:endParaRPr lang="en-GB"/>
           </a:p>
@@ -1055,7 +1055,7 @@
           <a:p>
             <a:fld id="{E84557DF-487D-4A7D-AC14-41C025B26206}" type="datetimeFigureOut">
               <a:rPr lang="en-GB" smtClean="0"/>
-              <a:t>21/10/2016</a:t>
+              <a:t>22/10/2016</a:t>
             </a:fld>
             <a:endParaRPr lang="en-GB"/>
           </a:p>
@@ -1235,7 +1235,7 @@
           <a:p>
             <a:fld id="{E84557DF-487D-4A7D-AC14-41C025B26206}" type="datetimeFigureOut">
               <a:rPr lang="en-GB" smtClean="0"/>
-              <a:t>21/10/2016</a:t>
+              <a:t>22/10/2016</a:t>
             </a:fld>
             <a:endParaRPr lang="en-GB"/>
           </a:p>
@@ -1405,7 +1405,7 @@
           <a:p>
             <a:fld id="{E84557DF-487D-4A7D-AC14-41C025B26206}" type="datetimeFigureOut">
               <a:rPr lang="en-GB" smtClean="0"/>
-              <a:t>21/10/2016</a:t>
+              <a:t>22/10/2016</a:t>
             </a:fld>
             <a:endParaRPr lang="en-GB"/>
           </a:p>
@@ -1651,7 +1651,7 @@
           <a:p>
             <a:fld id="{E84557DF-487D-4A7D-AC14-41C025B26206}" type="datetimeFigureOut">
               <a:rPr lang="en-GB" smtClean="0"/>
-              <a:t>21/10/2016</a:t>
+              <a:t>22/10/2016</a:t>
             </a:fld>
             <a:endParaRPr lang="en-GB"/>
           </a:p>
@@ -1883,7 +1883,7 @@
           <a:p>
             <a:fld id="{E84557DF-487D-4A7D-AC14-41C025B26206}" type="datetimeFigureOut">
               <a:rPr lang="en-GB" smtClean="0"/>
-              <a:t>21/10/2016</a:t>
+              <a:t>22/10/2016</a:t>
             </a:fld>
             <a:endParaRPr lang="en-GB"/>
           </a:p>
@@ -2250,7 +2250,7 @@
           <a:p>
             <a:fld id="{E84557DF-487D-4A7D-AC14-41C025B26206}" type="datetimeFigureOut">
               <a:rPr lang="en-GB" smtClean="0"/>
-              <a:t>21/10/2016</a:t>
+              <a:t>22/10/2016</a:t>
             </a:fld>
             <a:endParaRPr lang="en-GB"/>
           </a:p>
@@ -2368,7 +2368,7 @@
           <a:p>
             <a:fld id="{E84557DF-487D-4A7D-AC14-41C025B26206}" type="datetimeFigureOut">
               <a:rPr lang="en-GB" smtClean="0"/>
-              <a:t>21/10/2016</a:t>
+              <a:t>22/10/2016</a:t>
             </a:fld>
             <a:endParaRPr lang="en-GB"/>
           </a:p>
@@ -2463,7 +2463,7 @@
           <a:p>
             <a:fld id="{E84557DF-487D-4A7D-AC14-41C025B26206}" type="datetimeFigureOut">
               <a:rPr lang="en-GB" smtClean="0"/>
-              <a:t>21/10/2016</a:t>
+              <a:t>22/10/2016</a:t>
             </a:fld>
             <a:endParaRPr lang="en-GB"/>
           </a:p>
@@ -2740,7 +2740,7 @@
           <a:p>
             <a:fld id="{E84557DF-487D-4A7D-AC14-41C025B26206}" type="datetimeFigureOut">
               <a:rPr lang="en-GB" smtClean="0"/>
-              <a:t>21/10/2016</a:t>
+              <a:t>22/10/2016</a:t>
             </a:fld>
             <a:endParaRPr lang="en-GB"/>
           </a:p>
@@ -2993,7 +2993,7 @@
           <a:p>
             <a:fld id="{E84557DF-487D-4A7D-AC14-41C025B26206}" type="datetimeFigureOut">
               <a:rPr lang="en-GB" smtClean="0"/>
-              <a:t>21/10/2016</a:t>
+              <a:t>22/10/2016</a:t>
             </a:fld>
             <a:endParaRPr lang="en-GB"/>
           </a:p>
@@ -3206,7 +3206,7 @@
           <a:p>
             <a:fld id="{E84557DF-487D-4A7D-AC14-41C025B26206}" type="datetimeFigureOut">
               <a:rPr lang="en-GB" smtClean="0"/>
-              <a:t>21/10/2016</a:t>
+              <a:t>22/10/2016</a:t>
             </a:fld>
             <a:endParaRPr lang="en-GB"/>
           </a:p>

</xml_diff>

<commit_message>
AB - 5th row of map locations completed
</commit_message>
<xml_diff>
--- a/GroudLevelMap.pptx
+++ b/GroudLevelMap.pptx
@@ -269,7 +269,7 @@
           <a:p>
             <a:fld id="{4324A8F5-F1ED-4D05-8890-CA30F1CF831D}" type="datetimeFigureOut">
               <a:rPr lang="en-GB" smtClean="0"/>
-              <a:t>22/10/2016</a:t>
+              <a:t>13/11/2016</a:t>
             </a:fld>
             <a:endParaRPr lang="en-GB"/>
           </a:p>
@@ -885,7 +885,7 @@
           <a:p>
             <a:fld id="{E84557DF-487D-4A7D-AC14-41C025B26206}" type="datetimeFigureOut">
               <a:rPr lang="en-GB" smtClean="0"/>
-              <a:t>22/10/2016</a:t>
+              <a:t>13/11/2016</a:t>
             </a:fld>
             <a:endParaRPr lang="en-GB"/>
           </a:p>
@@ -1055,7 +1055,7 @@
           <a:p>
             <a:fld id="{E84557DF-487D-4A7D-AC14-41C025B26206}" type="datetimeFigureOut">
               <a:rPr lang="en-GB" smtClean="0"/>
-              <a:t>22/10/2016</a:t>
+              <a:t>13/11/2016</a:t>
             </a:fld>
             <a:endParaRPr lang="en-GB"/>
           </a:p>
@@ -1235,7 +1235,7 @@
           <a:p>
             <a:fld id="{E84557DF-487D-4A7D-AC14-41C025B26206}" type="datetimeFigureOut">
               <a:rPr lang="en-GB" smtClean="0"/>
-              <a:t>22/10/2016</a:t>
+              <a:t>13/11/2016</a:t>
             </a:fld>
             <a:endParaRPr lang="en-GB"/>
           </a:p>
@@ -1405,7 +1405,7 @@
           <a:p>
             <a:fld id="{E84557DF-487D-4A7D-AC14-41C025B26206}" type="datetimeFigureOut">
               <a:rPr lang="en-GB" smtClean="0"/>
-              <a:t>22/10/2016</a:t>
+              <a:t>13/11/2016</a:t>
             </a:fld>
             <a:endParaRPr lang="en-GB"/>
           </a:p>
@@ -1651,7 +1651,7 @@
           <a:p>
             <a:fld id="{E84557DF-487D-4A7D-AC14-41C025B26206}" type="datetimeFigureOut">
               <a:rPr lang="en-GB" smtClean="0"/>
-              <a:t>22/10/2016</a:t>
+              <a:t>13/11/2016</a:t>
             </a:fld>
             <a:endParaRPr lang="en-GB"/>
           </a:p>
@@ -1883,7 +1883,7 @@
           <a:p>
             <a:fld id="{E84557DF-487D-4A7D-AC14-41C025B26206}" type="datetimeFigureOut">
               <a:rPr lang="en-GB" smtClean="0"/>
-              <a:t>22/10/2016</a:t>
+              <a:t>13/11/2016</a:t>
             </a:fld>
             <a:endParaRPr lang="en-GB"/>
           </a:p>
@@ -2250,7 +2250,7 @@
           <a:p>
             <a:fld id="{E84557DF-487D-4A7D-AC14-41C025B26206}" type="datetimeFigureOut">
               <a:rPr lang="en-GB" smtClean="0"/>
-              <a:t>22/10/2016</a:t>
+              <a:t>13/11/2016</a:t>
             </a:fld>
             <a:endParaRPr lang="en-GB"/>
           </a:p>
@@ -2368,7 +2368,7 @@
           <a:p>
             <a:fld id="{E84557DF-487D-4A7D-AC14-41C025B26206}" type="datetimeFigureOut">
               <a:rPr lang="en-GB" smtClean="0"/>
-              <a:t>22/10/2016</a:t>
+              <a:t>13/11/2016</a:t>
             </a:fld>
             <a:endParaRPr lang="en-GB"/>
           </a:p>
@@ -2463,7 +2463,7 @@
           <a:p>
             <a:fld id="{E84557DF-487D-4A7D-AC14-41C025B26206}" type="datetimeFigureOut">
               <a:rPr lang="en-GB" smtClean="0"/>
-              <a:t>22/10/2016</a:t>
+              <a:t>13/11/2016</a:t>
             </a:fld>
             <a:endParaRPr lang="en-GB"/>
           </a:p>
@@ -2740,7 +2740,7 @@
           <a:p>
             <a:fld id="{E84557DF-487D-4A7D-AC14-41C025B26206}" type="datetimeFigureOut">
               <a:rPr lang="en-GB" smtClean="0"/>
-              <a:t>22/10/2016</a:t>
+              <a:t>13/11/2016</a:t>
             </a:fld>
             <a:endParaRPr lang="en-GB"/>
           </a:p>
@@ -2993,7 +2993,7 @@
           <a:p>
             <a:fld id="{E84557DF-487D-4A7D-AC14-41C025B26206}" type="datetimeFigureOut">
               <a:rPr lang="en-GB" smtClean="0"/>
-              <a:t>22/10/2016</a:t>
+              <a:t>13/11/2016</a:t>
             </a:fld>
             <a:endParaRPr lang="en-GB"/>
           </a:p>
@@ -3206,7 +3206,7 @@
           <a:p>
             <a:fld id="{E84557DF-487D-4A7D-AC14-41C025B26206}" type="datetimeFigureOut">
               <a:rPr lang="en-GB" smtClean="0"/>
-              <a:t>22/10/2016</a:t>
+              <a:t>13/11/2016</a:t>
             </a:fld>
             <a:endParaRPr lang="en-GB"/>
           </a:p>
@@ -5267,7 +5267,7 @@
                 <a:latin typeface="Arial" panose="020B0604020202020204" pitchFamily="34" charset="0"/>
                 <a:cs typeface="Arial" panose="020B0604020202020204" pitchFamily="34" charset="0"/>
               </a:rPr>
-              <a:t>Forrest 6</a:t>
+              <a:t>Forest 6</a:t>
             </a:r>
           </a:p>
         </p:txBody>
@@ -5280,7 +5280,7 @@
         </p:nvSpPr>
         <p:spPr>
           <a:xfrm>
-            <a:off x="3300820" y="3859076"/>
+            <a:off x="3300820" y="3829050"/>
             <a:ext cx="6409508" cy="1477328"/>
           </a:xfrm>
           <a:prstGeom prst="rect">
@@ -5377,7 +5377,7 @@
                 <a:latin typeface="Arial" panose="020B0604020202020204" pitchFamily="34" charset="0"/>
                 <a:cs typeface="Arial" panose="020B0604020202020204" pitchFamily="34" charset="0"/>
               </a:rPr>
-              <a:t>Forrest 7</a:t>
+              <a:t>Forest 7</a:t>
             </a:r>
           </a:p>
         </p:txBody>
@@ -5487,7 +5487,7 @@
                 <a:latin typeface="Arial" panose="020B0604020202020204" pitchFamily="34" charset="0"/>
                 <a:cs typeface="Arial" panose="020B0604020202020204" pitchFamily="34" charset="0"/>
               </a:rPr>
-              <a:t>Forrest 8</a:t>
+              <a:t>Forest 8</a:t>
             </a:r>
           </a:p>
         </p:txBody>
@@ -5707,7 +5707,7 @@
                 <a:latin typeface="Arial" panose="020B0604020202020204" pitchFamily="34" charset="0"/>
                 <a:cs typeface="Arial" panose="020B0604020202020204" pitchFamily="34" charset="0"/>
               </a:rPr>
-              <a:t>Forrest 9</a:t>
+              <a:t>Forest 9</a:t>
             </a:r>
           </a:p>
         </p:txBody>

</xml_diff>